<commit_message>
translate and whitepaper update
</commit_message>
<xml_diff>
--- a/docs/whitepaper/Sketch.pptx
+++ b/docs/whitepaper/Sketch.pptx
@@ -5,31 +5,32 @@
     <p:sldMasterId id="2147483936" r:id="rId2"/>
   </p:sldMasterIdLst>
   <p:notesMasterIdLst>
-    <p:notesMasterId r:id="rId4"/>
+    <p:notesMasterId r:id="rId5"/>
   </p:notesMasterIdLst>
   <p:sldIdLst>
-    <p:sldId id="5619" r:id="rId3"/>
+    <p:sldId id="5630" r:id="rId3"/>
+    <p:sldId id="5631" r:id="rId4"/>
   </p:sldIdLst>
   <p:sldSz cx="12192000" cy="6858000"/>
   <p:notesSz cx="7104063" cy="10234613"/>
   <p:embeddedFontLst>
     <p:embeddedFont>
       <p:font typeface="Cascadia Code" panose="020B0609020000020004" pitchFamily="49" charset="0"/>
-      <p:regular r:id="rId5"/>
-      <p:bold r:id="rId6"/>
-      <p:italic r:id="rId7"/>
-      <p:boldItalic r:id="rId8"/>
+      <p:regular r:id="rId6"/>
+      <p:bold r:id="rId7"/>
+      <p:italic r:id="rId8"/>
+      <p:boldItalic r:id="rId9"/>
     </p:embeddedFont>
     <p:embeddedFont>
       <p:font typeface="Verdana" panose="020B0604030504040204" pitchFamily="34" charset="0"/>
-      <p:regular r:id="rId9"/>
-      <p:bold r:id="rId10"/>
-      <p:italic r:id="rId11"/>
-      <p:boldItalic r:id="rId12"/>
+      <p:regular r:id="rId10"/>
+      <p:bold r:id="rId11"/>
+      <p:italic r:id="rId12"/>
+      <p:boldItalic r:id="rId13"/>
     </p:embeddedFont>
   </p:embeddedFontLst>
   <p:custDataLst>
-    <p:tags r:id="rId13"/>
+    <p:tags r:id="rId14"/>
   </p:custDataLst>
   <p:defaultTextStyle>
     <a:defPPr>
@@ -143,7 +144,8 @@
         </p14:section>
         <p14:section name="Abschnitt ohne Titel" id="{2EA90089-064C-4DE2-B718-E428842DE8B9}">
           <p14:sldIdLst>
-            <p14:sldId id="5619"/>
+            <p14:sldId id="5630"/>
+            <p14:sldId id="5631"/>
           </p14:sldIdLst>
         </p14:section>
       </p14:sectionLst>
@@ -969,7 +971,7 @@
           <a:p>
             <a:fld id="{7C1A76D4-7C98-456C-A304-D869D1BC4E95}" type="datetimeFigureOut">
               <a:rPr lang="de-DE" smtClean="0"/>
-              <a:t>02.12.2025</a:t>
+              <a:t>08.12.2025</a:t>
             </a:fld>
             <a:endParaRPr lang="de-DE"/>
           </a:p>
@@ -1150,7 +1152,7 @@
           <a:p>
             <a:fld id="{7C1A76D4-7C98-456C-A304-D869D1BC4E95}" type="datetimeFigureOut">
               <a:rPr lang="de-DE" smtClean="0"/>
-              <a:t>02.12.2025</a:t>
+              <a:t>08.12.2025</a:t>
             </a:fld>
             <a:endParaRPr lang="de-DE"/>
           </a:p>
@@ -1341,7 +1343,7 @@
           <a:p>
             <a:fld id="{7C1A76D4-7C98-456C-A304-D869D1BC4E95}" type="datetimeFigureOut">
               <a:rPr lang="de-DE" smtClean="0"/>
-              <a:t>02.12.2025</a:t>
+              <a:t>08.12.2025</a:t>
             </a:fld>
             <a:endParaRPr lang="de-DE"/>
           </a:p>
@@ -2192,7 +2194,7 @@
           <a:p>
             <a:fld id="{7C1A76D4-7C98-456C-A304-D869D1BC4E95}" type="datetimeFigureOut">
               <a:rPr lang="de-DE" smtClean="0"/>
-              <a:t>02.12.2025</a:t>
+              <a:t>08.12.2025</a:t>
             </a:fld>
             <a:endParaRPr lang="de-DE"/>
           </a:p>
@@ -2449,7 +2451,7 @@
           <a:p>
             <a:fld id="{7C1A76D4-7C98-456C-A304-D869D1BC4E95}" type="datetimeFigureOut">
               <a:rPr lang="de-DE" smtClean="0"/>
-              <a:t>02.12.2025</a:t>
+              <a:t>08.12.2025</a:t>
             </a:fld>
             <a:endParaRPr lang="de-DE"/>
           </a:p>
@@ -2692,7 +2694,7 @@
           <a:p>
             <a:fld id="{7C1A76D4-7C98-456C-A304-D869D1BC4E95}" type="datetimeFigureOut">
               <a:rPr lang="de-DE" smtClean="0"/>
-              <a:t>02.12.2025</a:t>
+              <a:t>08.12.2025</a:t>
             </a:fld>
             <a:endParaRPr lang="de-DE"/>
           </a:p>
@@ -3070,7 +3072,7 @@
           <a:p>
             <a:fld id="{7C1A76D4-7C98-456C-A304-D869D1BC4E95}" type="datetimeFigureOut">
               <a:rPr lang="de-DE" smtClean="0"/>
-              <a:t>02.12.2025</a:t>
+              <a:t>08.12.2025</a:t>
             </a:fld>
             <a:endParaRPr lang="de-DE"/>
           </a:p>
@@ -3199,7 +3201,7 @@
           <a:p>
             <a:fld id="{7C1A76D4-7C98-456C-A304-D869D1BC4E95}" type="datetimeFigureOut">
               <a:rPr lang="de-DE" smtClean="0"/>
-              <a:t>02.12.2025</a:t>
+              <a:t>08.12.2025</a:t>
             </a:fld>
             <a:endParaRPr lang="de-DE"/>
           </a:p>
@@ -3304,7 +3306,7 @@
           <a:p>
             <a:fld id="{7C1A76D4-7C98-456C-A304-D869D1BC4E95}" type="datetimeFigureOut">
               <a:rPr lang="de-DE" smtClean="0"/>
-              <a:t>02.12.2025</a:t>
+              <a:t>08.12.2025</a:t>
             </a:fld>
             <a:endParaRPr lang="de-DE"/>
           </a:p>
@@ -3592,7 +3594,7 @@
           <a:p>
             <a:fld id="{7C1A76D4-7C98-456C-A304-D869D1BC4E95}" type="datetimeFigureOut">
               <a:rPr lang="de-DE" smtClean="0"/>
-              <a:t>02.12.2025</a:t>
+              <a:t>08.12.2025</a:t>
             </a:fld>
             <a:endParaRPr lang="de-DE"/>
           </a:p>
@@ -3860,7 +3862,7 @@
           <a:p>
             <a:fld id="{7C1A76D4-7C98-456C-A304-D869D1BC4E95}" type="datetimeFigureOut">
               <a:rPr lang="de-DE" smtClean="0"/>
-              <a:t>02.12.2025</a:t>
+              <a:t>08.12.2025</a:t>
             </a:fld>
             <a:endParaRPr lang="de-DE"/>
           </a:p>
@@ -4084,7 +4086,7 @@
           <a:p>
             <a:fld id="{113EF97C-8245-4FCB-8044-26457775F786}" type="datetimeFigureOut">
               <a:rPr lang="en-DE" smtClean="0"/>
-              <a:t>12/02/2025</a:t>
+              <a:t>12/08/2025</a:t>
             </a:fld>
             <a:endParaRPr lang="en-DE" dirty="0"/>
           </a:p>
@@ -4568,7 +4570,7 @@
         <p:cNvPr id="1" name="">
           <a:extLst>
             <a:ext uri="{FF2B5EF4-FFF2-40B4-BE49-F238E27FC236}">
-              <a16:creationId xmlns:a16="http://schemas.microsoft.com/office/drawing/2014/main" id="{17C501B2-CBE5-7E53-7171-2F65519AFC10}"/>
+              <a16:creationId xmlns:a16="http://schemas.microsoft.com/office/drawing/2014/main" id="{2893228A-AF30-3224-9E14-0113C2CA1E6E}"/>
             </a:ext>
           </a:extLst>
         </p:cNvPr>
@@ -4588,7 +4590,7 @@
           <p:cNvPr id="45" name="Rechteck: abgerundete Ecken 44">
             <a:extLst>
               <a:ext uri="{FF2B5EF4-FFF2-40B4-BE49-F238E27FC236}">
-                <a16:creationId xmlns:a16="http://schemas.microsoft.com/office/drawing/2014/main" id="{54D7E35D-5C95-864E-A1E9-D7C893621A6D}"/>
+                <a16:creationId xmlns:a16="http://schemas.microsoft.com/office/drawing/2014/main" id="{1C05880A-BC67-D92D-C42A-BB1747CFBFAA}"/>
               </a:ext>
             </a:extLst>
           </p:cNvPr>
@@ -4657,7 +4659,7 @@
           <p:cNvPr id="40" name="Rechteck: abgerundete Ecken 39">
             <a:extLst>
               <a:ext uri="{FF2B5EF4-FFF2-40B4-BE49-F238E27FC236}">
-                <a16:creationId xmlns:a16="http://schemas.microsoft.com/office/drawing/2014/main" id="{B00DEFC1-DD48-E155-29AD-4F7AA51CB940}"/>
+                <a16:creationId xmlns:a16="http://schemas.microsoft.com/office/drawing/2014/main" id="{6F252BA8-ACE7-3D91-9BCE-529EB1E83EDB}"/>
               </a:ext>
             </a:extLst>
           </p:cNvPr>
@@ -4666,8 +4668,8 @@
         </p:nvSpPr>
         <p:spPr>
           <a:xfrm>
-            <a:off x="7376474" y="415883"/>
-            <a:ext cx="4034639" cy="2307606"/>
+            <a:off x="7938296" y="415883"/>
+            <a:ext cx="3472817" cy="2307606"/>
           </a:xfrm>
           <a:prstGeom prst="roundRect">
             <a:avLst>
@@ -4726,7 +4728,7 @@
           <p:cNvPr id="5" name="Textfeld 4">
             <a:extLst>
               <a:ext uri="{FF2B5EF4-FFF2-40B4-BE49-F238E27FC236}">
-                <a16:creationId xmlns:a16="http://schemas.microsoft.com/office/drawing/2014/main" id="{EA585DC5-4C3C-17B1-6031-85AB4A8E3AFB}"/>
+                <a16:creationId xmlns:a16="http://schemas.microsoft.com/office/drawing/2014/main" id="{A99CCCCE-7B85-ACE6-C91A-187F8C1A41A9}"/>
               </a:ext>
             </a:extLst>
           </p:cNvPr>
@@ -4735,8 +4737,8 @@
         </p:nvSpPr>
         <p:spPr>
           <a:xfrm>
-            <a:off x="409042" y="2094651"/>
-            <a:ext cx="10801514" cy="1059906"/>
+            <a:off x="851163" y="1967435"/>
+            <a:ext cx="1651653" cy="290336"/>
           </a:xfrm>
           <a:prstGeom prst="rect">
             <a:avLst/>
@@ -4761,32 +4763,8 @@
                 <a:ea typeface="ADLaM Display" panose="020F0502020204030204" pitchFamily="2" charset="0"/>
                 <a:cs typeface="Cascadia Code" panose="020B0609020000020004" pitchFamily="49" charset="0"/>
               </a:rPr>
-              <a:t>Lehrer/Trainer</a:t>
-            </a:r>
-            <a:br>
-              <a:rPr lang="de-DE" sz="1400" b="1" dirty="0">
-                <a:latin typeface="Courier New" panose="02070309020205020404" pitchFamily="49" charset="0"/>
-                <a:cs typeface="Courier New" panose="02070309020205020404" pitchFamily="49" charset="0"/>
-              </a:rPr>
-            </a:br>
-            <a:br>
-              <a:rPr lang="de-DE" sz="1400" b="1" dirty="0">
-                <a:latin typeface="Courier New" panose="02070309020205020404" pitchFamily="49" charset="0"/>
-                <a:cs typeface="Courier New" panose="02070309020205020404" pitchFamily="49" charset="0"/>
-              </a:rPr>
-            </a:br>
-            <a:br>
-              <a:rPr lang="de-DE" sz="1400" b="1" dirty="0">
-                <a:latin typeface="Courier New" panose="02070309020205020404" pitchFamily="49" charset="0"/>
-                <a:cs typeface="Courier New" panose="02070309020205020404" pitchFamily="49" charset="0"/>
-              </a:rPr>
-            </a:br>
-            <a:br>
-              <a:rPr lang="de-DE" sz="1400" b="1" dirty="0">
-                <a:latin typeface="Courier New" panose="02070309020205020404" pitchFamily="49" charset="0"/>
-                <a:cs typeface="Courier New" panose="02070309020205020404" pitchFamily="49" charset="0"/>
-              </a:rPr>
-            </a:br>
+              <a:t>Lehrer</a:t>
+            </a:r>
             <a:endParaRPr lang="de-DE" sz="1400" b="1" i="0" dirty="0">
               <a:effectLst/>
               <a:latin typeface="Courier New" panose="02070309020205020404" pitchFamily="49" charset="0"/>
@@ -4800,7 +4778,7 @@
           <p:cNvPr id="6" name="Textfeld 5">
             <a:extLst>
               <a:ext uri="{FF2B5EF4-FFF2-40B4-BE49-F238E27FC236}">
-                <a16:creationId xmlns:a16="http://schemas.microsoft.com/office/drawing/2014/main" id="{52CDBA20-367D-84B7-AECD-9AA7050C5A26}"/>
+                <a16:creationId xmlns:a16="http://schemas.microsoft.com/office/drawing/2014/main" id="{8CA110AA-7BB3-4226-A287-2C2F540D9B07}"/>
               </a:ext>
             </a:extLst>
           </p:cNvPr>
@@ -4845,7 +4823,7 @@
           <p:cNvPr id="11" name="Textfeld 10">
             <a:extLst>
               <a:ext uri="{FF2B5EF4-FFF2-40B4-BE49-F238E27FC236}">
-                <a16:creationId xmlns:a16="http://schemas.microsoft.com/office/drawing/2014/main" id="{31572E5D-1948-6427-43FD-9F44E8F5EDC7}"/>
+                <a16:creationId xmlns:a16="http://schemas.microsoft.com/office/drawing/2014/main" id="{65489366-CFE5-8439-BDC2-C4EDE05F44F3}"/>
               </a:ext>
             </a:extLst>
           </p:cNvPr>
@@ -4912,7 +4890,7 @@
           <p:cNvPr id="14" name="Textfeld 13">
             <a:extLst>
               <a:ext uri="{FF2B5EF4-FFF2-40B4-BE49-F238E27FC236}">
-                <a16:creationId xmlns:a16="http://schemas.microsoft.com/office/drawing/2014/main" id="{767856F9-05D7-AEDF-3B5E-1510CEB86D72}"/>
+                <a16:creationId xmlns:a16="http://schemas.microsoft.com/office/drawing/2014/main" id="{DCF8167E-FA0B-886B-03C2-66436A79DD08}"/>
               </a:ext>
             </a:extLst>
           </p:cNvPr>
@@ -4921,7 +4899,7 @@
         </p:nvSpPr>
         <p:spPr>
           <a:xfrm>
-            <a:off x="3732368" y="2710183"/>
+            <a:off x="3356903" y="2399530"/>
             <a:ext cx="3472817" cy="284693"/>
           </a:xfrm>
           <a:prstGeom prst="rect">
@@ -4955,7 +4933,7 @@
                 <a:ea typeface="ADLaM Display" panose="020F0502020204030204" pitchFamily="2" charset="0"/>
                 <a:cs typeface="Cascadia Code" panose="020B0609020000020004" pitchFamily="49" charset="0"/>
               </a:rPr>
-              <a:t> Admin UI</a:t>
+              <a:t> Data Explorer</a:t>
             </a:r>
           </a:p>
         </p:txBody>
@@ -4965,7 +4943,7 @@
           <p:cNvPr id="15" name="Rechteck: abgerundete Ecken 14">
             <a:extLst>
               <a:ext uri="{FF2B5EF4-FFF2-40B4-BE49-F238E27FC236}">
-                <a16:creationId xmlns:a16="http://schemas.microsoft.com/office/drawing/2014/main" id="{6C9238F9-20B6-1230-5413-11FD83D2EA85}"/>
+                <a16:creationId xmlns:a16="http://schemas.microsoft.com/office/drawing/2014/main" id="{F25C75D4-2ACE-7E80-0C62-434A3FDB2155}"/>
               </a:ext>
             </a:extLst>
           </p:cNvPr>
@@ -4974,8 +4952,8 @@
         </p:nvSpPr>
         <p:spPr>
           <a:xfrm>
-            <a:off x="7804483" y="787627"/>
-            <a:ext cx="3316706" cy="1573503"/>
+            <a:off x="8154185" y="787627"/>
+            <a:ext cx="2967003" cy="1573503"/>
           </a:xfrm>
           <a:prstGeom prst="roundRect">
             <a:avLst>
@@ -5026,7 +5004,7 @@
           <p:cNvPr id="16" name="Textfeld 15">
             <a:extLst>
               <a:ext uri="{FF2B5EF4-FFF2-40B4-BE49-F238E27FC236}">
-                <a16:creationId xmlns:a16="http://schemas.microsoft.com/office/drawing/2014/main" id="{C75C47D1-CEAA-1DD9-52CC-CA7407F48870}"/>
+                <a16:creationId xmlns:a16="http://schemas.microsoft.com/office/drawing/2014/main" id="{F21E19A9-1BD0-2A47-447C-8AC82243BD0D}"/>
               </a:ext>
             </a:extLst>
           </p:cNvPr>
@@ -5035,8 +5013,8 @@
         </p:nvSpPr>
         <p:spPr>
           <a:xfrm>
-            <a:off x="7833105" y="865888"/>
-            <a:ext cx="3235948" cy="1444626"/>
+            <a:off x="8286160" y="993882"/>
+            <a:ext cx="2712191" cy="1054135"/>
           </a:xfrm>
           <a:prstGeom prst="rect">
             <a:avLst/>
@@ -5056,19 +5034,20 @@
               <a:buNone/>
             </a:pPr>
             <a:r>
+              <a:rPr lang="de-DE" sz="1400" i="1" dirty="0">
+                <a:latin typeface="Cascadia Code" panose="020B0609020000020004" pitchFamily="49" charset="0"/>
+                <a:ea typeface="ADLaM Display" panose="020F0502020204030204" pitchFamily="2" charset="0"/>
+                <a:cs typeface="Cascadia Code" panose="020B0609020000020004" pitchFamily="49" charset="0"/>
+              </a:rPr>
+              <a:t>skillpilot.com</a:t>
+            </a:r>
+            <a:r>
               <a:rPr lang="de-DE" sz="1400" b="1" dirty="0">
                 <a:latin typeface="Cascadia Code" panose="020B0609020000020004" pitchFamily="49" charset="0"/>
                 <a:ea typeface="ADLaM Display" panose="020F0502020204030204" pitchFamily="2" charset="0"/>
                 <a:cs typeface="Cascadia Code" panose="020B0609020000020004" pitchFamily="49" charset="0"/>
-                <a:hlinkClick r:id="rId2">
-                  <a:extLst>
-                    <a:ext uri="{A12FA001-AC4F-418D-AE19-62706E023703}">
-                      <ahyp:hlinkClr xmlns:ahyp="http://schemas.microsoft.com/office/drawing/2018/hyperlinkcolor" val="tx"/>
-                    </a:ext>
-                  </a:extLst>
-                </a:hlinkClick>
-              </a:rPr>
-              <a:t>https://skillpilot.com</a:t>
+              </a:rPr>
+              <a:t> Server</a:t>
             </a:r>
             <a:br>
               <a:rPr lang="de-DE" sz="1400" b="1" dirty="0">
@@ -5090,7 +5069,7 @@
                 <a:ea typeface="ADLaM Display" panose="020F0502020204030204" pitchFamily="2" charset="0"/>
                 <a:cs typeface="Cascadia Code" panose="020B0609020000020004" pitchFamily="49" charset="0"/>
               </a:rPr>
-              <a:t>SkillPilot</a:t>
+              <a:t>Skill</a:t>
             </a:r>
             <a:r>
               <a:rPr lang="de-DE" sz="1400" b="1" dirty="0">
@@ -5098,7 +5077,7 @@
                 <a:ea typeface="ADLaM Display" panose="020F0502020204030204" pitchFamily="2" charset="0"/>
                 <a:cs typeface="Cascadia Code" panose="020B0609020000020004" pitchFamily="49" charset="0"/>
               </a:rPr>
-              <a:t> Server</a:t>
+              <a:t>-Graph</a:t>
             </a:r>
             <a:br>
               <a:rPr lang="de-DE" sz="1400" b="1" dirty="0">
@@ -5115,36 +5094,6 @@
               </a:rPr>
             </a:br>
             <a:r>
-              <a:rPr lang="de-DE" sz="1400" b="1" dirty="0" err="1">
-                <a:latin typeface="Cascadia Code" panose="020B0609020000020004" pitchFamily="49" charset="0"/>
-                <a:ea typeface="ADLaM Display" panose="020F0502020204030204" pitchFamily="2" charset="0"/>
-                <a:cs typeface="Cascadia Code" panose="020B0609020000020004" pitchFamily="49" charset="0"/>
-              </a:rPr>
-              <a:t>Skill</a:t>
-            </a:r>
-            <a:r>
-              <a:rPr lang="de-DE" sz="1400" b="1" dirty="0">
-                <a:latin typeface="Cascadia Code" panose="020B0609020000020004" pitchFamily="49" charset="0"/>
-                <a:ea typeface="ADLaM Display" panose="020F0502020204030204" pitchFamily="2" charset="0"/>
-                <a:cs typeface="Cascadia Code" panose="020B0609020000020004" pitchFamily="49" charset="0"/>
-              </a:rPr>
-              <a:t>-Graph</a:t>
-            </a:r>
-            <a:br>
-              <a:rPr lang="de-DE" sz="1400" b="1" dirty="0">
-                <a:latin typeface="Cascadia Code" panose="020B0609020000020004" pitchFamily="49" charset="0"/>
-                <a:ea typeface="ADLaM Display" panose="020F0502020204030204" pitchFamily="2" charset="0"/>
-                <a:cs typeface="Cascadia Code" panose="020B0609020000020004" pitchFamily="49" charset="0"/>
-              </a:rPr>
-            </a:br>
-            <a:br>
-              <a:rPr lang="de-DE" sz="1400" b="1" dirty="0">
-                <a:latin typeface="Cascadia Code" panose="020B0609020000020004" pitchFamily="49" charset="0"/>
-                <a:ea typeface="ADLaM Display" panose="020F0502020204030204" pitchFamily="2" charset="0"/>
-                <a:cs typeface="Cascadia Code" panose="020B0609020000020004" pitchFamily="49" charset="0"/>
-              </a:rPr>
-            </a:br>
-            <a:r>
               <a:rPr lang="de-DE" sz="1400" b="1" dirty="0">
                 <a:latin typeface="Cascadia Code" panose="020B0609020000020004" pitchFamily="49" charset="0"/>
                 <a:ea typeface="ADLaM Display" panose="020F0502020204030204" pitchFamily="2" charset="0"/>
@@ -5160,7 +5109,7 @@
           <p:cNvPr id="18" name="Gerade Verbindung mit Pfeil 17">
             <a:extLst>
               <a:ext uri="{FF2B5EF4-FFF2-40B4-BE49-F238E27FC236}">
-                <a16:creationId xmlns:a16="http://schemas.microsoft.com/office/drawing/2014/main" id="{DCA11FFF-30BB-8FA9-0438-59B833015B65}"/>
+                <a16:creationId xmlns:a16="http://schemas.microsoft.com/office/drawing/2014/main" id="{480434A3-6137-FDEC-69B4-47B6AC058662}"/>
               </a:ext>
             </a:extLst>
           </p:cNvPr>
@@ -5206,7 +5155,7 @@
           <p:cNvPr id="19" name="Gerade Verbindung mit Pfeil 18">
             <a:extLst>
               <a:ext uri="{FF2B5EF4-FFF2-40B4-BE49-F238E27FC236}">
-                <a16:creationId xmlns:a16="http://schemas.microsoft.com/office/drawing/2014/main" id="{5459184B-4DBD-9A1F-3E44-452FCB9AA96F}"/>
+                <a16:creationId xmlns:a16="http://schemas.microsoft.com/office/drawing/2014/main" id="{E944C2C6-7675-493B-E7F8-2D2B56D50300}"/>
               </a:ext>
             </a:extLst>
           </p:cNvPr>
@@ -5253,7 +5202,7 @@
           <p:cNvPr id="21" name="Gerade Verbindung mit Pfeil 20">
             <a:extLst>
               <a:ext uri="{FF2B5EF4-FFF2-40B4-BE49-F238E27FC236}">
-                <a16:creationId xmlns:a16="http://schemas.microsoft.com/office/drawing/2014/main" id="{AFAEE329-87A5-A241-7BEE-743814EE3CC8}"/>
+                <a16:creationId xmlns:a16="http://schemas.microsoft.com/office/drawing/2014/main" id="{4F96E85A-53D7-D603-1470-C927CADB5E16}"/>
               </a:ext>
             </a:extLst>
           </p:cNvPr>
@@ -5264,7 +5213,7 @@
         </p:nvCxnSpPr>
         <p:spPr>
           <a:xfrm>
-            <a:off x="2008969" y="1461179"/>
+            <a:off x="1849774" y="1528559"/>
             <a:ext cx="908627" cy="0"/>
           </a:xfrm>
           <a:prstGeom prst="straightConnector1">
@@ -5299,7 +5248,7 @@
           <p:cNvPr id="22" name="Gerade Verbindung mit Pfeil 21">
             <a:extLst>
               <a:ext uri="{FF2B5EF4-FFF2-40B4-BE49-F238E27FC236}">
-                <a16:creationId xmlns:a16="http://schemas.microsoft.com/office/drawing/2014/main" id="{669E8DFB-297E-F0E8-A44E-2295750EA6CD}"/>
+                <a16:creationId xmlns:a16="http://schemas.microsoft.com/office/drawing/2014/main" id="{A1D23187-837A-1A3D-ABBF-554475B4974F}"/>
               </a:ext>
             </a:extLst>
           </p:cNvPr>
@@ -5346,7 +5295,7 @@
           <p:cNvPr id="24" name="Gerade Verbindung mit Pfeil 23">
             <a:extLst>
               <a:ext uri="{FF2B5EF4-FFF2-40B4-BE49-F238E27FC236}">
-                <a16:creationId xmlns:a16="http://schemas.microsoft.com/office/drawing/2014/main" id="{1A96A111-0036-FCFB-D0E6-7D8816DA41BF}"/>
+                <a16:creationId xmlns:a16="http://schemas.microsoft.com/office/drawing/2014/main" id="{8A94B40A-4E7A-570C-18EE-D851897B0B87}"/>
               </a:ext>
             </a:extLst>
           </p:cNvPr>
@@ -5357,8 +5306,8 @@
         </p:nvCxnSpPr>
         <p:spPr>
           <a:xfrm>
-            <a:off x="6670467" y="1451749"/>
-            <a:ext cx="550466" cy="0"/>
+            <a:off x="7173798" y="1451749"/>
+            <a:ext cx="630685" cy="0"/>
           </a:xfrm>
           <a:prstGeom prst="straightConnector1">
             <a:avLst/>
@@ -5392,7 +5341,7 @@
           <p:cNvPr id="25" name="Gerade Verbindung mit Pfeil 24">
             <a:extLst>
               <a:ext uri="{FF2B5EF4-FFF2-40B4-BE49-F238E27FC236}">
-                <a16:creationId xmlns:a16="http://schemas.microsoft.com/office/drawing/2014/main" id="{D0069B8B-395A-025C-830E-6B4B136CA0F5}"/>
+                <a16:creationId xmlns:a16="http://schemas.microsoft.com/office/drawing/2014/main" id="{13637435-043B-63C9-16F8-78D0290BAC62}"/>
               </a:ext>
             </a:extLst>
           </p:cNvPr>
@@ -5438,7 +5387,7 @@
           <p:cNvPr id="27" name="Rechteck: abgerundete Ecken 26">
             <a:extLst>
               <a:ext uri="{FF2B5EF4-FFF2-40B4-BE49-F238E27FC236}">
-                <a16:creationId xmlns:a16="http://schemas.microsoft.com/office/drawing/2014/main" id="{00F03D46-67B6-E3CC-5D9B-793B5376C511}"/>
+                <a16:creationId xmlns:a16="http://schemas.microsoft.com/office/drawing/2014/main" id="{AD474FED-14A9-F314-6134-2371EFBB6D77}"/>
               </a:ext>
             </a:extLst>
           </p:cNvPr>
@@ -5499,7 +5448,7 @@
           <p:cNvPr id="28" name="Textfeld 27">
             <a:extLst>
               <a:ext uri="{FF2B5EF4-FFF2-40B4-BE49-F238E27FC236}">
-                <a16:creationId xmlns:a16="http://schemas.microsoft.com/office/drawing/2014/main" id="{0613A8E8-180F-E25D-0FD9-3CF2185748CF}"/>
+                <a16:creationId xmlns:a16="http://schemas.microsoft.com/office/drawing/2014/main" id="{1B35B23C-53D8-12C9-2D27-6652EEF6FEFD}"/>
               </a:ext>
             </a:extLst>
           </p:cNvPr>
@@ -5566,7 +5515,7 @@
           <p:cNvPr id="32" name="Gerade Verbindung mit Pfeil 31">
             <a:extLst>
               <a:ext uri="{FF2B5EF4-FFF2-40B4-BE49-F238E27FC236}">
-                <a16:creationId xmlns:a16="http://schemas.microsoft.com/office/drawing/2014/main" id="{E5811970-2043-51C6-381B-FA2BB9CABB56}"/>
+                <a16:creationId xmlns:a16="http://schemas.microsoft.com/office/drawing/2014/main" id="{75B0534C-7B3C-EFC7-6AE8-AC62AABF02B5}"/>
               </a:ext>
             </a:extLst>
           </p:cNvPr>
@@ -5612,7 +5561,7 @@
           <p:cNvPr id="34" name="Rechteck: abgerundete Ecken 33">
             <a:extLst>
               <a:ext uri="{FF2B5EF4-FFF2-40B4-BE49-F238E27FC236}">
-                <a16:creationId xmlns:a16="http://schemas.microsoft.com/office/drawing/2014/main" id="{BA47A6E3-EBEA-598C-120C-0B4D60C76BD3}"/>
+                <a16:creationId xmlns:a16="http://schemas.microsoft.com/office/drawing/2014/main" id="{D17EF9B1-8792-428D-7E63-2075A5043893}"/>
               </a:ext>
             </a:extLst>
           </p:cNvPr>
@@ -5673,7 +5622,7 @@
           <p:cNvPr id="35" name="Textfeld 34">
             <a:extLst>
               <a:ext uri="{FF2B5EF4-FFF2-40B4-BE49-F238E27FC236}">
-                <a16:creationId xmlns:a16="http://schemas.microsoft.com/office/drawing/2014/main" id="{04656DDC-69F6-D391-FB0D-DBBC6A161A8F}"/>
+                <a16:creationId xmlns:a16="http://schemas.microsoft.com/office/drawing/2014/main" id="{69852D8A-6E25-A7A7-3962-12A5A287AC3A}"/>
               </a:ext>
             </a:extLst>
           </p:cNvPr>
@@ -5718,7 +5667,7 @@
           <p:cNvPr id="36" name="Gerade Verbindung mit Pfeil 35">
             <a:extLst>
               <a:ext uri="{FF2B5EF4-FFF2-40B4-BE49-F238E27FC236}">
-                <a16:creationId xmlns:a16="http://schemas.microsoft.com/office/drawing/2014/main" id="{ED8E4013-8BFD-02ED-A344-31B154D778F7}"/>
+                <a16:creationId xmlns:a16="http://schemas.microsoft.com/office/drawing/2014/main" id="{4389440B-B11E-9331-1E3B-F358AAD7D1EB}"/>
               </a:ext>
             </a:extLst>
           </p:cNvPr>
@@ -5764,7 +5713,7 @@
           <p:cNvPr id="43" name="Textfeld 42">
             <a:extLst>
               <a:ext uri="{FF2B5EF4-FFF2-40B4-BE49-F238E27FC236}">
-                <a16:creationId xmlns:a16="http://schemas.microsoft.com/office/drawing/2014/main" id="{27EF21B1-CC51-69D3-6D36-CDDC37651237}"/>
+                <a16:creationId xmlns:a16="http://schemas.microsoft.com/office/drawing/2014/main" id="{3DE357B0-699F-D0D3-8433-D37FADA6D169}"/>
               </a:ext>
             </a:extLst>
           </p:cNvPr>
@@ -5773,8 +5722,8 @@
         </p:nvSpPr>
         <p:spPr>
           <a:xfrm>
-            <a:off x="8063794" y="489373"/>
-            <a:ext cx="3235948" cy="290464"/>
+            <a:off x="8229600" y="489373"/>
+            <a:ext cx="3070142" cy="290464"/>
           </a:xfrm>
           <a:prstGeom prst="rect">
             <a:avLst/>
@@ -5808,7 +5757,7 @@
           <p:cNvPr id="44" name="Textfeld 43">
             <a:extLst>
               <a:ext uri="{FF2B5EF4-FFF2-40B4-BE49-F238E27FC236}">
-                <a16:creationId xmlns:a16="http://schemas.microsoft.com/office/drawing/2014/main" id="{AB8BB6C9-7B6C-6175-DC2D-B941B9BC76D7}"/>
+                <a16:creationId xmlns:a16="http://schemas.microsoft.com/office/drawing/2014/main" id="{E25B346F-7B20-7E73-75D9-1E4B6EBB13EE}"/>
               </a:ext>
             </a:extLst>
           </p:cNvPr>
@@ -5817,7 +5766,7 @@
         </p:nvSpPr>
         <p:spPr>
           <a:xfrm>
-            <a:off x="7841254" y="2413025"/>
+            <a:off x="8130149" y="2399530"/>
             <a:ext cx="3235948" cy="290464"/>
           </a:xfrm>
           <a:prstGeom prst="rect">
@@ -5869,7 +5818,7 @@
           <p:cNvPr id="46" name="Textfeld 45">
             <a:extLst>
               <a:ext uri="{FF2B5EF4-FFF2-40B4-BE49-F238E27FC236}">
-                <a16:creationId xmlns:a16="http://schemas.microsoft.com/office/drawing/2014/main" id="{F63C62F3-7145-5503-78DA-47C25B00C141}"/>
+                <a16:creationId xmlns:a16="http://schemas.microsoft.com/office/drawing/2014/main" id="{E89166ED-20DA-9EDF-F95D-BC6FD5E6A826}"/>
               </a:ext>
             </a:extLst>
           </p:cNvPr>
@@ -5942,10 +5891,10 @@
       </p:sp>
       <p:pic>
         <p:nvPicPr>
-          <p:cNvPr id="17" name="Grafik 16">
+          <p:cNvPr id="37" name="Grafik 36" descr="Server Silhouette">
             <a:extLst>
               <a:ext uri="{FF2B5EF4-FFF2-40B4-BE49-F238E27FC236}">
-                <a16:creationId xmlns:a16="http://schemas.microsoft.com/office/drawing/2014/main" id="{47966FC2-CBAB-BC2E-5AFE-67E60F159398}"/>
+                <a16:creationId xmlns:a16="http://schemas.microsoft.com/office/drawing/2014/main" id="{96979750-3988-A65F-3347-CFBB23E65674}"/>
               </a:ext>
             </a:extLst>
           </p:cNvPr>
@@ -5955,34 +5904,33 @@
           <p:nvPr/>
         </p:nvPicPr>
         <p:blipFill>
-          <a:blip r:embed="rId3"/>
+          <a:blip r:embed="rId2">
+            <a:extLst>
+              <a:ext uri="{96DAC541-7B7A-43D3-8B79-37D633B846F1}">
+                <asvg:svgBlip xmlns:asvg="http://schemas.microsoft.com/office/drawing/2016/SVG/main" r:embed="rId3"/>
+              </a:ext>
+            </a:extLst>
+          </a:blip>
           <a:stretch>
             <a:fillRect/>
           </a:stretch>
         </p:blipFill>
         <p:spPr>
           <a:xfrm>
-            <a:off x="3013090" y="363798"/>
-            <a:ext cx="3560563" cy="2336461"/>
+            <a:off x="10011321" y="1209507"/>
+            <a:ext cx="914400" cy="914400"/>
           </a:xfrm>
           <a:prstGeom prst="rect">
             <a:avLst/>
           </a:prstGeom>
-          <a:ln>
-            <a:solidFill>
-              <a:schemeClr val="bg1">
-                <a:lumMod val="65000"/>
-              </a:schemeClr>
-            </a:solidFill>
-          </a:ln>
         </p:spPr>
       </p:pic>
       <p:pic>
         <p:nvPicPr>
-          <p:cNvPr id="37" name="Grafik 36" descr="Server Silhouette">
+          <p:cNvPr id="39" name="Grafik 38" descr="Verwirrte Person Silhouette">
             <a:extLst>
               <a:ext uri="{FF2B5EF4-FFF2-40B4-BE49-F238E27FC236}">
-                <a16:creationId xmlns:a16="http://schemas.microsoft.com/office/drawing/2014/main" id="{EC1220BD-51BF-C225-29E8-06DE7B4CB06A}"/>
+                <a16:creationId xmlns:a16="http://schemas.microsoft.com/office/drawing/2014/main" id="{9EC7897C-8D41-FE6C-BFBC-0304324563E6}"/>
               </a:ext>
             </a:extLst>
           </p:cNvPr>
@@ -6005,8 +5953,8 @@
         </p:blipFill>
         <p:spPr>
           <a:xfrm>
-            <a:off x="10011321" y="1209507"/>
-            <a:ext cx="914400" cy="914400"/>
+            <a:off x="653573" y="702115"/>
+            <a:ext cx="1185758" cy="1185758"/>
           </a:xfrm>
           <a:prstGeom prst="rect">
             <a:avLst/>
@@ -6015,10 +5963,10 @@
       </p:pic>
       <p:pic>
         <p:nvPicPr>
-          <p:cNvPr id="39" name="Grafik 38" descr="Verwirrte Person Silhouette">
+          <p:cNvPr id="41" name="Grafik 40" descr="Verwirrte Person Silhouette">
             <a:extLst>
               <a:ext uri="{FF2B5EF4-FFF2-40B4-BE49-F238E27FC236}">
-                <a16:creationId xmlns:a16="http://schemas.microsoft.com/office/drawing/2014/main" id="{11E4959F-C74F-8B1C-AD29-FA1484AE41C7}"/>
+                <a16:creationId xmlns:a16="http://schemas.microsoft.com/office/drawing/2014/main" id="{E5CE2389-27B4-425A-14A4-33B2EC9C44B3}"/>
               </a:ext>
             </a:extLst>
           </p:cNvPr>
@@ -6028,10 +5976,10 @@
           <p:nvPr/>
         </p:nvPicPr>
         <p:blipFill>
-          <a:blip r:embed="rId6">
+          <a:blip r:embed="rId4">
             <a:extLst>
               <a:ext uri="{96DAC541-7B7A-43D3-8B79-37D633B846F1}">
-                <asvg:svgBlip xmlns:asvg="http://schemas.microsoft.com/office/drawing/2016/SVG/main" r:embed="rId7"/>
+                <asvg:svgBlip xmlns:asvg="http://schemas.microsoft.com/office/drawing/2016/SVG/main" r:embed="rId5"/>
               </a:ext>
             </a:extLst>
           </a:blip>
@@ -6041,42 +5989,6 @@
         </p:blipFill>
         <p:spPr>
           <a:xfrm>
-            <a:off x="667670" y="716659"/>
-            <a:ext cx="1185758" cy="1185758"/>
-          </a:xfrm>
-          <a:prstGeom prst="rect">
-            <a:avLst/>
-          </a:prstGeom>
-        </p:spPr>
-      </p:pic>
-      <p:pic>
-        <p:nvPicPr>
-          <p:cNvPr id="41" name="Grafik 40" descr="Verwirrte Person Silhouette">
-            <a:extLst>
-              <a:ext uri="{FF2B5EF4-FFF2-40B4-BE49-F238E27FC236}">
-                <a16:creationId xmlns:a16="http://schemas.microsoft.com/office/drawing/2014/main" id="{FBA2AE59-C82C-C3DB-EA5F-B64C9AB3BB13}"/>
-              </a:ext>
-            </a:extLst>
-          </p:cNvPr>
-          <p:cNvPicPr>
-            <a:picLocks noChangeAspect="1"/>
-          </p:cNvPicPr>
-          <p:nvPr/>
-        </p:nvPicPr>
-        <p:blipFill>
-          <a:blip r:embed="rId6">
-            <a:extLst>
-              <a:ext uri="{96DAC541-7B7A-43D3-8B79-37D633B846F1}">
-                <asvg:svgBlip xmlns:asvg="http://schemas.microsoft.com/office/drawing/2016/SVG/main" r:embed="rId7"/>
-              </a:ext>
-            </a:extLst>
-          </a:blip>
-          <a:stretch>
-            <a:fillRect/>
-          </a:stretch>
-        </p:blipFill>
-        <p:spPr>
-          <a:xfrm>
             <a:off x="664016" y="3505558"/>
             <a:ext cx="1185758" cy="1185758"/>
           </a:xfrm>
@@ -6090,7 +6002,7 @@
           <p:cNvPr id="47" name="Gerade Verbindung mit Pfeil 46">
             <a:extLst>
               <a:ext uri="{FF2B5EF4-FFF2-40B4-BE49-F238E27FC236}">
-                <a16:creationId xmlns:a16="http://schemas.microsoft.com/office/drawing/2014/main" id="{322AE32C-AA75-8750-43B8-CF0EF4337FD5}"/>
+                <a16:creationId xmlns:a16="http://schemas.microsoft.com/office/drawing/2014/main" id="{4F1F5C89-B3A0-1468-38E5-D66A48DC05E4}"/>
               </a:ext>
             </a:extLst>
           </p:cNvPr>
@@ -6136,7 +6048,7 @@
           <p:cNvPr id="49" name="Textfeld 48">
             <a:extLst>
               <a:ext uri="{FF2B5EF4-FFF2-40B4-BE49-F238E27FC236}">
-                <a16:creationId xmlns:a16="http://schemas.microsoft.com/office/drawing/2014/main" id="{84844BBE-FF95-21F0-C937-35B0F338E16F}"/>
+                <a16:creationId xmlns:a16="http://schemas.microsoft.com/office/drawing/2014/main" id="{DF9DF363-69A8-9B6A-BF6F-A8D45E3344D7}"/>
               </a:ext>
             </a:extLst>
           </p:cNvPr>
@@ -6145,8 +6057,8 @@
         </p:nvSpPr>
         <p:spPr>
           <a:xfrm>
-            <a:off x="176106" y="6116976"/>
-            <a:ext cx="2293717" cy="477054"/>
+            <a:off x="301658" y="6116976"/>
+            <a:ext cx="2369371" cy="477054"/>
           </a:xfrm>
           <a:prstGeom prst="rect">
             <a:avLst/>
@@ -6171,7 +6083,7 @@
                 <a:ea typeface="ADLaM Display" panose="020F0502020204030204" pitchFamily="2" charset="0"/>
                 <a:cs typeface="Cascadia Code" panose="020B0609020000020004" pitchFamily="49" charset="0"/>
               </a:rPr>
-              <a:t>Pfeilrichtung ist </a:t>
+              <a:t>Pfeil in </a:t>
             </a:r>
             <a:br>
               <a:rPr lang="de-DE" sz="1400" b="1" dirty="0">
@@ -6196,7 +6108,7 @@
           <p:cNvPr id="51" name="Grafik 50" descr="Ein Bild, das gelb, Dreieck, Stern enthält.&#10;&#10;KI-generierte Inhalte können fehlerhaft sein.">
             <a:extLst>
               <a:ext uri="{FF2B5EF4-FFF2-40B4-BE49-F238E27FC236}">
-                <a16:creationId xmlns:a16="http://schemas.microsoft.com/office/drawing/2014/main" id="{70E55F68-E519-72BC-B316-6FBE7DDB1473}"/>
+                <a16:creationId xmlns:a16="http://schemas.microsoft.com/office/drawing/2014/main" id="{B763C414-9988-0CC3-E842-7BFBAD72E014}"/>
               </a:ext>
             </a:extLst>
           </p:cNvPr>
@@ -6206,7 +6118,7 @@
           <p:nvPr/>
         </p:nvPicPr>
         <p:blipFill>
-          <a:blip r:embed="rId8" cstate="print">
+          <a:blip r:embed="rId6" cstate="print">
             <a:extLst>
               <a:ext uri="{28A0092B-C50C-407E-A947-70E740481C1C}">
                 <a14:useLocalDpi xmlns:a14="http://schemas.microsoft.com/office/drawing/2010/main" val="0"/>
@@ -6232,7 +6144,7 @@
           <p:cNvPr id="53" name="Grafik 52">
             <a:extLst>
               <a:ext uri="{FF2B5EF4-FFF2-40B4-BE49-F238E27FC236}">
-                <a16:creationId xmlns:a16="http://schemas.microsoft.com/office/drawing/2014/main" id="{C11E0A5A-9B73-9FC5-40FC-23675308BA49}"/>
+                <a16:creationId xmlns:a16="http://schemas.microsoft.com/office/drawing/2014/main" id="{A25E41AE-DE9F-C12D-2358-366100E84516}"/>
               </a:ext>
             </a:extLst>
           </p:cNvPr>
@@ -6242,10 +6154,10 @@
           <p:nvPr/>
         </p:nvPicPr>
         <p:blipFill>
-          <a:blip r:embed="rId9">
+          <a:blip r:embed="rId7">
             <a:extLst>
               <a:ext uri="{96DAC541-7B7A-43D3-8B79-37D633B846F1}">
-                <asvg:svgBlip xmlns:asvg="http://schemas.microsoft.com/office/drawing/2016/SVG/main" r:embed="rId10"/>
+                <asvg:svgBlip xmlns:asvg="http://schemas.microsoft.com/office/drawing/2016/SVG/main" r:embed="rId8"/>
               </a:ext>
             </a:extLst>
           </a:blip>
@@ -6263,10 +6175,2093 @@
           </a:prstGeom>
         </p:spPr>
       </p:pic>
+      <p:pic>
+        <p:nvPicPr>
+          <p:cNvPr id="3" name="Grafik 2">
+            <a:extLst>
+              <a:ext uri="{FF2B5EF4-FFF2-40B4-BE49-F238E27FC236}">
+                <a16:creationId xmlns:a16="http://schemas.microsoft.com/office/drawing/2014/main" id="{4CD58F6B-0423-BD91-7783-367E73CB2F4A}"/>
+              </a:ext>
+            </a:extLst>
+          </p:cNvPr>
+          <p:cNvPicPr>
+            <a:picLocks noChangeAspect="1"/>
+          </p:cNvPicPr>
+          <p:nvPr/>
+        </p:nvPicPr>
+        <p:blipFill>
+          <a:blip r:embed="rId9"/>
+          <a:stretch>
+            <a:fillRect/>
+          </a:stretch>
+        </p:blipFill>
+        <p:spPr>
+          <a:xfrm>
+            <a:off x="3120723" y="344094"/>
+            <a:ext cx="3794959" cy="2016072"/>
+          </a:xfrm>
+          <a:prstGeom prst="rect">
+            <a:avLst/>
+          </a:prstGeom>
+          <a:ln>
+            <a:solidFill>
+              <a:schemeClr val="bg1">
+                <a:lumMod val="75000"/>
+              </a:schemeClr>
+            </a:solidFill>
+          </a:ln>
+        </p:spPr>
+      </p:pic>
+      <p:pic>
+        <p:nvPicPr>
+          <p:cNvPr id="12" name="Grafik 11" descr="Zeitung Silhouette">
+            <a:extLst>
+              <a:ext uri="{FF2B5EF4-FFF2-40B4-BE49-F238E27FC236}">
+                <a16:creationId xmlns:a16="http://schemas.microsoft.com/office/drawing/2014/main" id="{80BC0795-8528-18BF-045D-AE5BF12CE06C}"/>
+              </a:ext>
+            </a:extLst>
+          </p:cNvPr>
+          <p:cNvPicPr>
+            <a:picLocks noChangeAspect="1"/>
+          </p:cNvPicPr>
+          <p:nvPr/>
+        </p:nvPicPr>
+        <p:blipFill>
+          <a:blip r:embed="rId10">
+            <a:extLst>
+              <a:ext uri="{96DAC541-7B7A-43D3-8B79-37D633B846F1}">
+                <asvg:svgBlip xmlns:asvg="http://schemas.microsoft.com/office/drawing/2016/SVG/main" r:embed="rId11"/>
+              </a:ext>
+            </a:extLst>
+          </a:blip>
+          <a:stretch>
+            <a:fillRect/>
+          </a:stretch>
+        </p:blipFill>
+        <p:spPr>
+          <a:xfrm>
+            <a:off x="1873262" y="178978"/>
+            <a:ext cx="678455" cy="678455"/>
+          </a:xfrm>
+          <a:prstGeom prst="rect">
+            <a:avLst/>
+          </a:prstGeom>
+        </p:spPr>
+      </p:pic>
+      <p:sp>
+        <p:nvSpPr>
+          <p:cNvPr id="20" name="Textfeld 19">
+            <a:extLst>
+              <a:ext uri="{FF2B5EF4-FFF2-40B4-BE49-F238E27FC236}">
+                <a16:creationId xmlns:a16="http://schemas.microsoft.com/office/drawing/2014/main" id="{E5A012FD-A5B2-8D4B-9B34-4C6E9FB00E91}"/>
+              </a:ext>
+            </a:extLst>
+          </p:cNvPr>
+          <p:cNvSpPr txBox="1"/>
+          <p:nvPr/>
+        </p:nvSpPr>
+        <p:spPr>
+          <a:xfrm>
+            <a:off x="1427613" y="737048"/>
+            <a:ext cx="1570273" cy="482696"/>
+          </a:xfrm>
+          <a:prstGeom prst="rect">
+            <a:avLst/>
+          </a:prstGeom>
+          <a:noFill/>
+        </p:spPr>
+        <p:txBody>
+          <a:bodyPr wrap="square">
+            <a:spAutoFit/>
+          </a:bodyPr>
+          <a:lstStyle/>
+          <a:p>
+            <a:pPr algn="ctr" latinLnBrk="1">
+              <a:lnSpc>
+                <a:spcPts val="1470"/>
+              </a:lnSpc>
+              <a:buNone/>
+            </a:pPr>
+            <a:r>
+              <a:rPr lang="de-DE" sz="1400" b="1" dirty="0">
+                <a:latin typeface="Cascadia Code" panose="020B0609020000020004" pitchFamily="49" charset="0"/>
+                <a:ea typeface="ADLaM Display" panose="020F0502020204030204" pitchFamily="2" charset="0"/>
+                <a:cs typeface="Cascadia Code" panose="020B0609020000020004" pitchFamily="49" charset="0"/>
+              </a:rPr>
+              <a:t>Daten</a:t>
+            </a:r>
+            <a:br>
+              <a:rPr lang="de-DE" sz="1400" b="1" dirty="0">
+                <a:latin typeface="Cascadia Code" panose="020B0609020000020004" pitchFamily="49" charset="0"/>
+                <a:ea typeface="ADLaM Display" panose="020F0502020204030204" pitchFamily="2" charset="0"/>
+                <a:cs typeface="Cascadia Code" panose="020B0609020000020004" pitchFamily="49" charset="0"/>
+              </a:rPr>
+            </a:br>
+            <a:r>
+              <a:rPr lang="de-DE" sz="1400" b="1" dirty="0">
+                <a:latin typeface="Cascadia Code" panose="020B0609020000020004" pitchFamily="49" charset="0"/>
+                <a:ea typeface="ADLaM Display" panose="020F0502020204030204" pitchFamily="2" charset="0"/>
+                <a:cs typeface="Cascadia Code" panose="020B0609020000020004" pitchFamily="49" charset="0"/>
+              </a:rPr>
+              <a:t>-backup</a:t>
+            </a:r>
+            <a:endParaRPr lang="de-DE" sz="1400" b="1" i="0" dirty="0">
+              <a:effectLst/>
+              <a:latin typeface="Courier New" panose="02070309020205020404" pitchFamily="49" charset="0"/>
+              <a:cs typeface="Courier New" panose="02070309020205020404" pitchFamily="49" charset="0"/>
+            </a:endParaRPr>
+          </a:p>
+        </p:txBody>
+      </p:sp>
     </p:spTree>
     <p:extLst>
       <p:ext uri="{BB962C8B-B14F-4D97-AF65-F5344CB8AC3E}">
-        <p14:creationId xmlns:p14="http://schemas.microsoft.com/office/powerpoint/2010/main" val="536345117"/>
+        <p14:creationId xmlns:p14="http://schemas.microsoft.com/office/powerpoint/2010/main" val="968386374"/>
+      </p:ext>
+    </p:extLst>
+  </p:cSld>
+  <p:clrMapOvr>
+    <a:masterClrMapping/>
+  </p:clrMapOvr>
+  <p:transition/>
+</p:sld>
+</file>
+
+<file path=ppt/slides/slide2.xml><?xml version="1.0" encoding="utf-8"?>
+<p:sld xmlns:a="http://schemas.openxmlformats.org/drawingml/2006/main" xmlns:r="http://schemas.openxmlformats.org/officeDocument/2006/relationships" xmlns:p="http://schemas.openxmlformats.org/presentationml/2006/main">
+  <p:cSld>
+    <p:spTree>
+      <p:nvGrpSpPr>
+        <p:cNvPr id="1" name="">
+          <a:extLst>
+            <a:ext uri="{FF2B5EF4-FFF2-40B4-BE49-F238E27FC236}">
+              <a16:creationId xmlns:a16="http://schemas.microsoft.com/office/drawing/2014/main" id="{C0B0F9F0-485B-6BE0-690D-6AFBED0E8625}"/>
+            </a:ext>
+          </a:extLst>
+        </p:cNvPr>
+        <p:cNvGrpSpPr/>
+        <p:nvPr/>
+      </p:nvGrpSpPr>
+      <p:grpSpPr>
+        <a:xfrm>
+          <a:off x="0" y="0"/>
+          <a:ext cx="0" cy="0"/>
+          <a:chOff x="0" y="0"/>
+          <a:chExt cx="0" cy="0"/>
+        </a:xfrm>
+      </p:grpSpPr>
+      <p:sp>
+        <p:nvSpPr>
+          <p:cNvPr id="45" name="Rechteck: abgerundete Ecken 44">
+            <a:extLst>
+              <a:ext uri="{FF2B5EF4-FFF2-40B4-BE49-F238E27FC236}">
+                <a16:creationId xmlns:a16="http://schemas.microsoft.com/office/drawing/2014/main" id="{841757E3-DB2A-6E31-41DC-827F85E03CEF}"/>
+              </a:ext>
+            </a:extLst>
+          </p:cNvPr>
+          <p:cNvSpPr/>
+          <p:nvPr/>
+        </p:nvSpPr>
+        <p:spPr>
+          <a:xfrm>
+            <a:off x="3013090" y="3361335"/>
+            <a:ext cx="8398018" cy="3232695"/>
+          </a:xfrm>
+          <a:prstGeom prst="roundRect">
+            <a:avLst>
+              <a:gd name="adj" fmla="val 6303"/>
+            </a:avLst>
+          </a:prstGeom>
+          <a:solidFill>
+            <a:srgbClr val="FFF2CC">
+              <a:alpha val="40000"/>
+            </a:srgbClr>
+          </a:solidFill>
+          <a:ln>
+            <a:prstDash val="dash"/>
+          </a:ln>
+        </p:spPr>
+        <p:style>
+          <a:lnRef idx="2">
+            <a:schemeClr val="dk1"/>
+          </a:lnRef>
+          <a:fillRef idx="1">
+            <a:schemeClr val="lt1"/>
+          </a:fillRef>
+          <a:effectRef idx="0">
+            <a:schemeClr val="dk1"/>
+          </a:effectRef>
+          <a:fontRef idx="minor">
+            <a:schemeClr val="dk1"/>
+          </a:fontRef>
+        </p:style>
+        <p:txBody>
+          <a:bodyPr wrap="square" rtlCol="0" anchor="ctr">
+            <a:spAutoFit/>
+          </a:bodyPr>
+          <a:lstStyle/>
+          <a:p>
+            <a:pPr algn="l">
+              <a:spcBef>
+                <a:spcPct val="50000"/>
+              </a:spcBef>
+            </a:pPr>
+            <a:endParaRPr lang="de-DE" b="1" dirty="0" err="1">
+              <a:solidFill>
+                <a:schemeClr val="tx1">
+                  <a:lumMod val="65000"/>
+                  <a:lumOff val="35000"/>
+                </a:schemeClr>
+              </a:solidFill>
+              <a:latin typeface="Courier New" panose="02070309020205020404" pitchFamily="49" charset="0"/>
+              <a:cs typeface="Courier New" panose="02070309020205020404" pitchFamily="49" charset="0"/>
+            </a:endParaRPr>
+          </a:p>
+        </p:txBody>
+      </p:sp>
+      <p:sp>
+        <p:nvSpPr>
+          <p:cNvPr id="40" name="Rechteck: abgerundete Ecken 39">
+            <a:extLst>
+              <a:ext uri="{FF2B5EF4-FFF2-40B4-BE49-F238E27FC236}">
+                <a16:creationId xmlns:a16="http://schemas.microsoft.com/office/drawing/2014/main" id="{7349767E-65CD-739E-9F5D-60657F66D3E4}"/>
+              </a:ext>
+            </a:extLst>
+          </p:cNvPr>
+          <p:cNvSpPr/>
+          <p:nvPr/>
+        </p:nvSpPr>
+        <p:spPr>
+          <a:xfrm>
+            <a:off x="7938296" y="415883"/>
+            <a:ext cx="3472817" cy="2307606"/>
+          </a:xfrm>
+          <a:prstGeom prst="roundRect">
+            <a:avLst>
+              <a:gd name="adj" fmla="val 6303"/>
+            </a:avLst>
+          </a:prstGeom>
+          <a:solidFill>
+            <a:srgbClr val="E2F0D9">
+              <a:alpha val="40000"/>
+            </a:srgbClr>
+          </a:solidFill>
+          <a:ln>
+            <a:prstDash val="dash"/>
+          </a:ln>
+        </p:spPr>
+        <p:style>
+          <a:lnRef idx="2">
+            <a:schemeClr val="dk1"/>
+          </a:lnRef>
+          <a:fillRef idx="1">
+            <a:schemeClr val="lt1"/>
+          </a:fillRef>
+          <a:effectRef idx="0">
+            <a:schemeClr val="dk1"/>
+          </a:effectRef>
+          <a:fontRef idx="minor">
+            <a:schemeClr val="dk1"/>
+          </a:fontRef>
+        </p:style>
+        <p:txBody>
+          <a:bodyPr wrap="square" rtlCol="0" anchor="ctr">
+            <a:spAutoFit/>
+          </a:bodyPr>
+          <a:lstStyle/>
+          <a:p>
+            <a:pPr algn="l">
+              <a:spcBef>
+                <a:spcPct val="50000"/>
+              </a:spcBef>
+            </a:pPr>
+            <a:endParaRPr lang="de-DE" b="1" dirty="0" err="1">
+              <a:solidFill>
+                <a:schemeClr val="tx1">
+                  <a:lumMod val="65000"/>
+                  <a:lumOff val="35000"/>
+                </a:schemeClr>
+              </a:solidFill>
+              <a:latin typeface="Courier New" panose="02070309020205020404" pitchFamily="49" charset="0"/>
+              <a:cs typeface="Courier New" panose="02070309020205020404" pitchFamily="49" charset="0"/>
+            </a:endParaRPr>
+          </a:p>
+        </p:txBody>
+      </p:sp>
+      <p:sp>
+        <p:nvSpPr>
+          <p:cNvPr id="5" name="Textfeld 4">
+            <a:extLst>
+              <a:ext uri="{FF2B5EF4-FFF2-40B4-BE49-F238E27FC236}">
+                <a16:creationId xmlns:a16="http://schemas.microsoft.com/office/drawing/2014/main" id="{B4020DC8-F1C7-329C-0C71-F74AC71A685E}"/>
+              </a:ext>
+            </a:extLst>
+          </p:cNvPr>
+          <p:cNvSpPr txBox="1"/>
+          <p:nvPr/>
+        </p:nvSpPr>
+        <p:spPr>
+          <a:xfrm>
+            <a:off x="763059" y="1879211"/>
+            <a:ext cx="10758069" cy="1059906"/>
+          </a:xfrm>
+          <a:prstGeom prst="rect">
+            <a:avLst/>
+          </a:prstGeom>
+          <a:noFill/>
+        </p:spPr>
+        <p:txBody>
+          <a:bodyPr wrap="square">
+            <a:spAutoFit/>
+          </a:bodyPr>
+          <a:lstStyle/>
+          <a:p>
+            <a:pPr algn="l" latinLnBrk="1">
+              <a:lnSpc>
+                <a:spcPts val="1470"/>
+              </a:lnSpc>
+              <a:buNone/>
+            </a:pPr>
+            <a:r>
+              <a:rPr lang="de-DE" sz="1400" b="1" dirty="0" err="1">
+                <a:latin typeface="Cascadia Code" panose="020B0609020000020004" pitchFamily="49" charset="0"/>
+                <a:ea typeface="ADLaM Display" panose="020F0502020204030204" pitchFamily="2" charset="0"/>
+                <a:cs typeface="Cascadia Code" panose="020B0609020000020004" pitchFamily="49" charset="0"/>
+              </a:rPr>
+              <a:t>educator</a:t>
+            </a:r>
+            <a:br>
+              <a:rPr lang="de-DE" sz="1400" b="1" dirty="0">
+                <a:latin typeface="Courier New" panose="02070309020205020404" pitchFamily="49" charset="0"/>
+                <a:cs typeface="Courier New" panose="02070309020205020404" pitchFamily="49" charset="0"/>
+              </a:rPr>
+            </a:br>
+            <a:br>
+              <a:rPr lang="de-DE" sz="1400" b="1" dirty="0">
+                <a:latin typeface="Courier New" panose="02070309020205020404" pitchFamily="49" charset="0"/>
+                <a:cs typeface="Courier New" panose="02070309020205020404" pitchFamily="49" charset="0"/>
+              </a:rPr>
+            </a:br>
+            <a:br>
+              <a:rPr lang="de-DE" sz="1400" b="1" dirty="0">
+                <a:latin typeface="Courier New" panose="02070309020205020404" pitchFamily="49" charset="0"/>
+                <a:cs typeface="Courier New" panose="02070309020205020404" pitchFamily="49" charset="0"/>
+              </a:rPr>
+            </a:br>
+            <a:br>
+              <a:rPr lang="de-DE" sz="1400" b="1" dirty="0">
+                <a:latin typeface="Courier New" panose="02070309020205020404" pitchFamily="49" charset="0"/>
+                <a:cs typeface="Courier New" panose="02070309020205020404" pitchFamily="49" charset="0"/>
+              </a:rPr>
+            </a:br>
+            <a:endParaRPr lang="de-DE" sz="1400" b="1" i="0" dirty="0">
+              <a:effectLst/>
+              <a:latin typeface="Courier New" panose="02070309020205020404" pitchFamily="49" charset="0"/>
+              <a:cs typeface="Courier New" panose="02070309020205020404" pitchFamily="49" charset="0"/>
+            </a:endParaRPr>
+          </a:p>
+        </p:txBody>
+      </p:sp>
+      <p:sp>
+        <p:nvSpPr>
+          <p:cNvPr id="6" name="Textfeld 5">
+            <a:extLst>
+              <a:ext uri="{FF2B5EF4-FFF2-40B4-BE49-F238E27FC236}">
+                <a16:creationId xmlns:a16="http://schemas.microsoft.com/office/drawing/2014/main" id="{7AC95E4C-3DBA-E1FB-1122-FA40F67D723A}"/>
+              </a:ext>
+            </a:extLst>
+          </p:cNvPr>
+          <p:cNvSpPr txBox="1"/>
+          <p:nvPr/>
+        </p:nvSpPr>
+        <p:spPr>
+          <a:xfrm>
+            <a:off x="780892" y="4745250"/>
+            <a:ext cx="1770825" cy="290464"/>
+          </a:xfrm>
+          <a:prstGeom prst="rect">
+            <a:avLst/>
+          </a:prstGeom>
+          <a:noFill/>
+        </p:spPr>
+        <p:txBody>
+          <a:bodyPr wrap="square">
+            <a:spAutoFit/>
+          </a:bodyPr>
+          <a:lstStyle/>
+          <a:p>
+            <a:pPr algn="l" latinLnBrk="1">
+              <a:lnSpc>
+                <a:spcPts val="1470"/>
+              </a:lnSpc>
+              <a:buNone/>
+            </a:pPr>
+            <a:r>
+              <a:rPr lang="de-DE" sz="1400" b="1" dirty="0" err="1">
+                <a:latin typeface="Cascadia Code" panose="020B0609020000020004" pitchFamily="49" charset="0"/>
+                <a:ea typeface="ADLaM Display" panose="020F0502020204030204" pitchFamily="2" charset="0"/>
+                <a:cs typeface="Cascadia Code" panose="020B0609020000020004" pitchFamily="49" charset="0"/>
+              </a:rPr>
+              <a:t>learner</a:t>
+            </a:r>
+            <a:endParaRPr lang="de-DE" sz="1400" b="1" dirty="0">
+              <a:latin typeface="Cascadia Code" panose="020B0609020000020004" pitchFamily="49" charset="0"/>
+              <a:ea typeface="ADLaM Display" panose="020F0502020204030204" pitchFamily="2" charset="0"/>
+              <a:cs typeface="Cascadia Code" panose="020B0609020000020004" pitchFamily="49" charset="0"/>
+            </a:endParaRPr>
+          </a:p>
+        </p:txBody>
+      </p:sp>
+      <p:sp>
+        <p:nvSpPr>
+          <p:cNvPr id="11" name="Textfeld 10">
+            <a:extLst>
+              <a:ext uri="{FF2B5EF4-FFF2-40B4-BE49-F238E27FC236}">
+                <a16:creationId xmlns:a16="http://schemas.microsoft.com/office/drawing/2014/main" id="{6786D3DB-8035-FB70-1D8D-85B4DC43B788}"/>
+              </a:ext>
+            </a:extLst>
+          </p:cNvPr>
+          <p:cNvSpPr txBox="1"/>
+          <p:nvPr/>
+        </p:nvSpPr>
+        <p:spPr>
+          <a:xfrm>
+            <a:off x="4077523" y="4885410"/>
+            <a:ext cx="1732276" cy="482824"/>
+          </a:xfrm>
+          <a:prstGeom prst="rect">
+            <a:avLst/>
+          </a:prstGeom>
+        </p:spPr>
+        <p:txBody>
+          <a:bodyPr wrap="square">
+            <a:spAutoFit/>
+          </a:bodyPr>
+          <a:lstStyle/>
+          <a:p>
+            <a:pPr algn="l" latinLnBrk="1">
+              <a:lnSpc>
+                <a:spcPts val="1470"/>
+              </a:lnSpc>
+              <a:buNone/>
+            </a:pPr>
+            <a:r>
+              <a:rPr lang="de-DE" sz="1400" b="1" dirty="0" err="1">
+                <a:latin typeface="Cascadia Code" panose="020B0609020000020004" pitchFamily="49" charset="0"/>
+                <a:ea typeface="ADLaM Display" panose="020F0502020204030204" pitchFamily="2" charset="0"/>
+                <a:cs typeface="Cascadia Code" panose="020B0609020000020004" pitchFamily="49" charset="0"/>
+              </a:rPr>
+              <a:t>SkillPilot</a:t>
+            </a:r>
+            <a:r>
+              <a:rPr lang="de-DE" sz="1400" b="1" dirty="0">
+                <a:latin typeface="Cascadia Code" panose="020B0609020000020004" pitchFamily="49" charset="0"/>
+                <a:ea typeface="ADLaM Display" panose="020F0502020204030204" pitchFamily="2" charset="0"/>
+                <a:cs typeface="Cascadia Code" panose="020B0609020000020004" pitchFamily="49" charset="0"/>
+              </a:rPr>
+              <a:t> GPT</a:t>
+            </a:r>
+            <a:br>
+              <a:rPr lang="de-DE" sz="1400" b="1" dirty="0">
+                <a:latin typeface="Cascadia Code" panose="020B0609020000020004" pitchFamily="49" charset="0"/>
+                <a:ea typeface="ADLaM Display" panose="020F0502020204030204" pitchFamily="2" charset="0"/>
+                <a:cs typeface="Cascadia Code" panose="020B0609020000020004" pitchFamily="49" charset="0"/>
+              </a:rPr>
+            </a:br>
+            <a:r>
+              <a:rPr lang="de-DE" sz="1400" b="1" dirty="0">
+                <a:latin typeface="Cascadia Code" panose="020B0609020000020004" pitchFamily="49" charset="0"/>
+                <a:ea typeface="ADLaM Display" panose="020F0502020204030204" pitchFamily="2" charset="0"/>
+                <a:cs typeface="Cascadia Code" panose="020B0609020000020004" pitchFamily="49" charset="0"/>
+              </a:rPr>
+              <a:t>(ChatGPT UI)</a:t>
+            </a:r>
+          </a:p>
+        </p:txBody>
+      </p:sp>
+      <p:sp>
+        <p:nvSpPr>
+          <p:cNvPr id="14" name="Textfeld 13">
+            <a:extLst>
+              <a:ext uri="{FF2B5EF4-FFF2-40B4-BE49-F238E27FC236}">
+                <a16:creationId xmlns:a16="http://schemas.microsoft.com/office/drawing/2014/main" id="{F291C344-4DA6-72CF-37A4-796CFF009BBC}"/>
+              </a:ext>
+            </a:extLst>
+          </p:cNvPr>
+          <p:cNvSpPr txBox="1"/>
+          <p:nvPr/>
+        </p:nvSpPr>
+        <p:spPr>
+          <a:xfrm>
+            <a:off x="3356903" y="2399530"/>
+            <a:ext cx="3472817" cy="284693"/>
+          </a:xfrm>
+          <a:prstGeom prst="rect">
+            <a:avLst/>
+          </a:prstGeom>
+          <a:noFill/>
+        </p:spPr>
+        <p:txBody>
+          <a:bodyPr wrap="square">
+            <a:spAutoFit/>
+          </a:bodyPr>
+          <a:lstStyle/>
+          <a:p>
+            <a:pPr algn="l" latinLnBrk="1">
+              <a:lnSpc>
+                <a:spcPts val="1470"/>
+              </a:lnSpc>
+              <a:buNone/>
+            </a:pPr>
+            <a:r>
+              <a:rPr lang="de-DE" sz="1400" b="1" dirty="0" err="1">
+                <a:latin typeface="Cascadia Code" panose="020B0609020000020004" pitchFamily="49" charset="0"/>
+                <a:ea typeface="ADLaM Display" panose="020F0502020204030204" pitchFamily="2" charset="0"/>
+                <a:cs typeface="Cascadia Code" panose="020B0609020000020004" pitchFamily="49" charset="0"/>
+              </a:rPr>
+              <a:t>SkillPilot</a:t>
+            </a:r>
+            <a:r>
+              <a:rPr lang="de-DE" sz="1400" b="1" dirty="0">
+                <a:latin typeface="Cascadia Code" panose="020B0609020000020004" pitchFamily="49" charset="0"/>
+                <a:ea typeface="ADLaM Display" panose="020F0502020204030204" pitchFamily="2" charset="0"/>
+                <a:cs typeface="Cascadia Code" panose="020B0609020000020004" pitchFamily="49" charset="0"/>
+              </a:rPr>
+              <a:t> </a:t>
+            </a:r>
+            <a:r>
+              <a:rPr lang="de-DE" sz="1400" b="1" dirty="0" err="1">
+                <a:latin typeface="Cascadia Code" panose="020B0609020000020004" pitchFamily="49" charset="0"/>
+                <a:ea typeface="ADLaM Display" panose="020F0502020204030204" pitchFamily="2" charset="0"/>
+                <a:cs typeface="Cascadia Code" panose="020B0609020000020004" pitchFamily="49" charset="0"/>
+              </a:rPr>
+              <a:t>data</a:t>
+            </a:r>
+            <a:r>
+              <a:rPr lang="de-DE" sz="1400" b="1" dirty="0">
+                <a:latin typeface="Cascadia Code" panose="020B0609020000020004" pitchFamily="49" charset="0"/>
+                <a:ea typeface="ADLaM Display" panose="020F0502020204030204" pitchFamily="2" charset="0"/>
+                <a:cs typeface="Cascadia Code" panose="020B0609020000020004" pitchFamily="49" charset="0"/>
+              </a:rPr>
+              <a:t> </a:t>
+            </a:r>
+            <a:r>
+              <a:rPr lang="de-DE" sz="1400" b="1" dirty="0" err="1">
+                <a:latin typeface="Cascadia Code" panose="020B0609020000020004" pitchFamily="49" charset="0"/>
+                <a:ea typeface="ADLaM Display" panose="020F0502020204030204" pitchFamily="2" charset="0"/>
+                <a:cs typeface="Cascadia Code" panose="020B0609020000020004" pitchFamily="49" charset="0"/>
+              </a:rPr>
+              <a:t>explorer</a:t>
+            </a:r>
+            <a:endParaRPr lang="de-DE" sz="1400" b="1" dirty="0">
+              <a:latin typeface="Cascadia Code" panose="020B0609020000020004" pitchFamily="49" charset="0"/>
+              <a:ea typeface="ADLaM Display" panose="020F0502020204030204" pitchFamily="2" charset="0"/>
+              <a:cs typeface="Cascadia Code" panose="020B0609020000020004" pitchFamily="49" charset="0"/>
+            </a:endParaRPr>
+          </a:p>
+        </p:txBody>
+      </p:sp>
+      <p:sp>
+        <p:nvSpPr>
+          <p:cNvPr id="15" name="Rechteck: abgerundete Ecken 14">
+            <a:extLst>
+              <a:ext uri="{FF2B5EF4-FFF2-40B4-BE49-F238E27FC236}">
+                <a16:creationId xmlns:a16="http://schemas.microsoft.com/office/drawing/2014/main" id="{18FA1F73-8C98-BC73-3A09-553D8A2ECEFE}"/>
+              </a:ext>
+            </a:extLst>
+          </p:cNvPr>
+          <p:cNvSpPr/>
+          <p:nvPr/>
+        </p:nvSpPr>
+        <p:spPr>
+          <a:xfrm>
+            <a:off x="8154185" y="787627"/>
+            <a:ext cx="2967003" cy="1573503"/>
+          </a:xfrm>
+          <a:prstGeom prst="roundRect">
+            <a:avLst>
+              <a:gd name="adj" fmla="val 6303"/>
+            </a:avLst>
+          </a:prstGeom>
+        </p:spPr>
+        <p:style>
+          <a:lnRef idx="2">
+            <a:schemeClr val="dk1"/>
+          </a:lnRef>
+          <a:fillRef idx="1">
+            <a:schemeClr val="lt1"/>
+          </a:fillRef>
+          <a:effectRef idx="0">
+            <a:schemeClr val="dk1"/>
+          </a:effectRef>
+          <a:fontRef idx="minor">
+            <a:schemeClr val="dk1"/>
+          </a:fontRef>
+        </p:style>
+        <p:txBody>
+          <a:bodyPr wrap="square" rtlCol="0" anchor="ctr">
+            <a:spAutoFit/>
+          </a:bodyPr>
+          <a:lstStyle/>
+          <a:p>
+            <a:pPr algn="l">
+              <a:spcBef>
+                <a:spcPct val="50000"/>
+              </a:spcBef>
+            </a:pPr>
+            <a:endParaRPr lang="de-DE" b="1" dirty="0" err="1">
+              <a:solidFill>
+                <a:schemeClr val="tx1">
+                  <a:lumMod val="65000"/>
+                  <a:lumOff val="35000"/>
+                </a:schemeClr>
+              </a:solidFill>
+              <a:latin typeface="Courier New" panose="02070309020205020404" pitchFamily="49" charset="0"/>
+              <a:cs typeface="Courier New" panose="02070309020205020404" pitchFamily="49" charset="0"/>
+            </a:endParaRPr>
+          </a:p>
+        </p:txBody>
+      </p:sp>
+      <p:sp>
+        <p:nvSpPr>
+          <p:cNvPr id="16" name="Textfeld 15">
+            <a:extLst>
+              <a:ext uri="{FF2B5EF4-FFF2-40B4-BE49-F238E27FC236}">
+                <a16:creationId xmlns:a16="http://schemas.microsoft.com/office/drawing/2014/main" id="{DBBCEDC6-206F-0BE1-BB6B-B789E82A2975}"/>
+              </a:ext>
+            </a:extLst>
+          </p:cNvPr>
+          <p:cNvSpPr txBox="1"/>
+          <p:nvPr/>
+        </p:nvSpPr>
+        <p:spPr>
+          <a:xfrm>
+            <a:off x="8286160" y="993882"/>
+            <a:ext cx="2712191" cy="1054135"/>
+          </a:xfrm>
+          <a:prstGeom prst="rect">
+            <a:avLst/>
+          </a:prstGeom>
+          <a:noFill/>
+        </p:spPr>
+        <p:txBody>
+          <a:bodyPr wrap="square">
+            <a:spAutoFit/>
+          </a:bodyPr>
+          <a:lstStyle/>
+          <a:p>
+            <a:pPr algn="l" latinLnBrk="1">
+              <a:lnSpc>
+                <a:spcPts val="1470"/>
+              </a:lnSpc>
+              <a:buNone/>
+            </a:pPr>
+            <a:r>
+              <a:rPr lang="de-DE" sz="1400" i="1" dirty="0">
+                <a:latin typeface="Cascadia Code" panose="020B0609020000020004" pitchFamily="49" charset="0"/>
+                <a:ea typeface="ADLaM Display" panose="020F0502020204030204" pitchFamily="2" charset="0"/>
+                <a:cs typeface="Cascadia Code" panose="020B0609020000020004" pitchFamily="49" charset="0"/>
+              </a:rPr>
+              <a:t>skillpilot.com</a:t>
+            </a:r>
+            <a:r>
+              <a:rPr lang="de-DE" sz="1400" b="1" dirty="0">
+                <a:latin typeface="Cascadia Code" panose="020B0609020000020004" pitchFamily="49" charset="0"/>
+                <a:ea typeface="ADLaM Display" panose="020F0502020204030204" pitchFamily="2" charset="0"/>
+                <a:cs typeface="Cascadia Code" panose="020B0609020000020004" pitchFamily="49" charset="0"/>
+              </a:rPr>
+              <a:t> </a:t>
+            </a:r>
+            <a:r>
+              <a:rPr lang="de-DE" sz="1400" b="1" dirty="0" err="1">
+                <a:latin typeface="Cascadia Code" panose="020B0609020000020004" pitchFamily="49" charset="0"/>
+                <a:ea typeface="ADLaM Display" panose="020F0502020204030204" pitchFamily="2" charset="0"/>
+                <a:cs typeface="Cascadia Code" panose="020B0609020000020004" pitchFamily="49" charset="0"/>
+              </a:rPr>
+              <a:t>server</a:t>
+            </a:r>
+            <a:br>
+              <a:rPr lang="de-DE" sz="1400" b="1" dirty="0">
+                <a:latin typeface="Cascadia Code" panose="020B0609020000020004" pitchFamily="49" charset="0"/>
+                <a:ea typeface="ADLaM Display" panose="020F0502020204030204" pitchFamily="2" charset="0"/>
+                <a:cs typeface="Cascadia Code" panose="020B0609020000020004" pitchFamily="49" charset="0"/>
+              </a:rPr>
+            </a:br>
+            <a:br>
+              <a:rPr lang="de-DE" sz="1400" b="1" dirty="0">
+                <a:latin typeface="Cascadia Code" panose="020B0609020000020004" pitchFamily="49" charset="0"/>
+                <a:ea typeface="ADLaM Display" panose="020F0502020204030204" pitchFamily="2" charset="0"/>
+                <a:cs typeface="Cascadia Code" panose="020B0609020000020004" pitchFamily="49" charset="0"/>
+              </a:rPr>
+            </a:br>
+            <a:r>
+              <a:rPr lang="de-DE" sz="1400" b="1" dirty="0" err="1">
+                <a:latin typeface="Cascadia Code" panose="020B0609020000020004" pitchFamily="49" charset="0"/>
+                <a:ea typeface="ADLaM Display" panose="020F0502020204030204" pitchFamily="2" charset="0"/>
+                <a:cs typeface="Cascadia Code" panose="020B0609020000020004" pitchFamily="49" charset="0"/>
+              </a:rPr>
+              <a:t>skill</a:t>
+            </a:r>
+            <a:r>
+              <a:rPr lang="de-DE" sz="1400" b="1" dirty="0">
+                <a:latin typeface="Cascadia Code" panose="020B0609020000020004" pitchFamily="49" charset="0"/>
+                <a:ea typeface="ADLaM Display" panose="020F0502020204030204" pitchFamily="2" charset="0"/>
+                <a:cs typeface="Cascadia Code" panose="020B0609020000020004" pitchFamily="49" charset="0"/>
+              </a:rPr>
+              <a:t> </a:t>
+            </a:r>
+            <a:r>
+              <a:rPr lang="de-DE" sz="1400" b="1" dirty="0" err="1">
+                <a:latin typeface="Cascadia Code" panose="020B0609020000020004" pitchFamily="49" charset="0"/>
+                <a:ea typeface="ADLaM Display" panose="020F0502020204030204" pitchFamily="2" charset="0"/>
+                <a:cs typeface="Cascadia Code" panose="020B0609020000020004" pitchFamily="49" charset="0"/>
+              </a:rPr>
+              <a:t>graph</a:t>
+            </a:r>
+            <a:br>
+              <a:rPr lang="de-DE" sz="1400" b="1" dirty="0">
+                <a:latin typeface="Cascadia Code" panose="020B0609020000020004" pitchFamily="49" charset="0"/>
+                <a:ea typeface="ADLaM Display" panose="020F0502020204030204" pitchFamily="2" charset="0"/>
+                <a:cs typeface="Cascadia Code" panose="020B0609020000020004" pitchFamily="49" charset="0"/>
+              </a:rPr>
+            </a:br>
+            <a:br>
+              <a:rPr lang="de-DE" sz="1400" b="1" dirty="0">
+                <a:latin typeface="Cascadia Code" panose="020B0609020000020004" pitchFamily="49" charset="0"/>
+                <a:ea typeface="ADLaM Display" panose="020F0502020204030204" pitchFamily="2" charset="0"/>
+                <a:cs typeface="Cascadia Code" panose="020B0609020000020004" pitchFamily="49" charset="0"/>
+              </a:rPr>
+            </a:br>
+            <a:r>
+              <a:rPr lang="de-DE" sz="1400" b="1" dirty="0" err="1">
+                <a:latin typeface="Cascadia Code" panose="020B0609020000020004" pitchFamily="49" charset="0"/>
+                <a:ea typeface="ADLaM Display" panose="020F0502020204030204" pitchFamily="2" charset="0"/>
+                <a:cs typeface="Cascadia Code" panose="020B0609020000020004" pitchFamily="49" charset="0"/>
+              </a:rPr>
+              <a:t>mastery</a:t>
+            </a:r>
+            <a:endParaRPr lang="de-DE" sz="1400" b="1" dirty="0">
+              <a:latin typeface="Cascadia Code" panose="020B0609020000020004" pitchFamily="49" charset="0"/>
+              <a:ea typeface="ADLaM Display" panose="020F0502020204030204" pitchFamily="2" charset="0"/>
+              <a:cs typeface="Cascadia Code" panose="020B0609020000020004" pitchFamily="49" charset="0"/>
+            </a:endParaRPr>
+          </a:p>
+        </p:txBody>
+      </p:sp>
+      <p:cxnSp>
+        <p:nvCxnSpPr>
+          <p:cNvPr id="18" name="Gerade Verbindung mit Pfeil 17">
+            <a:extLst>
+              <a:ext uri="{FF2B5EF4-FFF2-40B4-BE49-F238E27FC236}">
+                <a16:creationId xmlns:a16="http://schemas.microsoft.com/office/drawing/2014/main" id="{217F1750-EC9B-CE23-D6EC-EB0FAAC40B0F}"/>
+              </a:ext>
+            </a:extLst>
+          </p:cNvPr>
+          <p:cNvCxnSpPr>
+            <a:cxnSpLocks/>
+          </p:cNvCxnSpPr>
+          <p:nvPr/>
+        </p:nvCxnSpPr>
+        <p:spPr>
+          <a:xfrm flipV="1">
+            <a:off x="1685475" y="2782108"/>
+            <a:ext cx="1244072" cy="1337688"/>
+          </a:xfrm>
+          <a:prstGeom prst="straightConnector1">
+            <a:avLst/>
+          </a:prstGeom>
+          <a:ln w="28575">
+            <a:solidFill>
+              <a:schemeClr val="bg1">
+                <a:lumMod val="65000"/>
+              </a:schemeClr>
+            </a:solidFill>
+            <a:tailEnd type="triangle"/>
+          </a:ln>
+        </p:spPr>
+        <p:style>
+          <a:lnRef idx="1">
+            <a:schemeClr val="accent1"/>
+          </a:lnRef>
+          <a:fillRef idx="0">
+            <a:schemeClr val="accent1"/>
+          </a:fillRef>
+          <a:effectRef idx="0">
+            <a:schemeClr val="accent1"/>
+          </a:effectRef>
+          <a:fontRef idx="minor">
+            <a:schemeClr val="tx1"/>
+          </a:fontRef>
+        </p:style>
+      </p:cxnSp>
+      <p:cxnSp>
+        <p:nvCxnSpPr>
+          <p:cNvPr id="19" name="Gerade Verbindung mit Pfeil 18">
+            <a:extLst>
+              <a:ext uri="{FF2B5EF4-FFF2-40B4-BE49-F238E27FC236}">
+                <a16:creationId xmlns:a16="http://schemas.microsoft.com/office/drawing/2014/main" id="{7C3B0BE1-EED3-39FD-F1FC-E0D25DA37148}"/>
+              </a:ext>
+            </a:extLst>
+          </p:cNvPr>
+          <p:cNvCxnSpPr>
+            <a:cxnSpLocks/>
+          </p:cNvCxnSpPr>
+          <p:nvPr/>
+        </p:nvCxnSpPr>
+        <p:spPr>
+          <a:xfrm>
+            <a:off x="1743901" y="4198524"/>
+            <a:ext cx="1803445" cy="0"/>
+          </a:xfrm>
+          <a:prstGeom prst="straightConnector1">
+            <a:avLst/>
+          </a:prstGeom>
+          <a:ln w="28575">
+            <a:solidFill>
+              <a:schemeClr val="bg1">
+                <a:lumMod val="65000"/>
+              </a:schemeClr>
+            </a:solidFill>
+            <a:headEnd type="triangle" w="med" len="med"/>
+            <a:tailEnd type="triangle" w="med" len="med"/>
+          </a:ln>
+        </p:spPr>
+        <p:style>
+          <a:lnRef idx="1">
+            <a:schemeClr val="accent1"/>
+          </a:lnRef>
+          <a:fillRef idx="0">
+            <a:schemeClr val="accent1"/>
+          </a:fillRef>
+          <a:effectRef idx="0">
+            <a:schemeClr val="accent1"/>
+          </a:effectRef>
+          <a:fontRef idx="minor">
+            <a:schemeClr val="tx1"/>
+          </a:fontRef>
+        </p:style>
+      </p:cxnSp>
+      <p:cxnSp>
+        <p:nvCxnSpPr>
+          <p:cNvPr id="21" name="Gerade Verbindung mit Pfeil 20">
+            <a:extLst>
+              <a:ext uri="{FF2B5EF4-FFF2-40B4-BE49-F238E27FC236}">
+                <a16:creationId xmlns:a16="http://schemas.microsoft.com/office/drawing/2014/main" id="{C46F31A2-6EDB-7CC1-7BE8-18298377D9D9}"/>
+              </a:ext>
+            </a:extLst>
+          </p:cNvPr>
+          <p:cNvCxnSpPr>
+            <a:cxnSpLocks/>
+          </p:cNvCxnSpPr>
+          <p:nvPr/>
+        </p:nvCxnSpPr>
+        <p:spPr>
+          <a:xfrm>
+            <a:off x="1849774" y="1528559"/>
+            <a:ext cx="908627" cy="0"/>
+          </a:xfrm>
+          <a:prstGeom prst="straightConnector1">
+            <a:avLst/>
+          </a:prstGeom>
+          <a:ln w="28575">
+            <a:solidFill>
+              <a:schemeClr val="bg1">
+                <a:lumMod val="65000"/>
+              </a:schemeClr>
+            </a:solidFill>
+            <a:tailEnd type="triangle"/>
+          </a:ln>
+        </p:spPr>
+        <p:style>
+          <a:lnRef idx="1">
+            <a:schemeClr val="accent1"/>
+          </a:lnRef>
+          <a:fillRef idx="0">
+            <a:schemeClr val="accent1"/>
+          </a:fillRef>
+          <a:effectRef idx="0">
+            <a:schemeClr val="accent1"/>
+          </a:effectRef>
+          <a:fontRef idx="minor">
+            <a:schemeClr val="tx1"/>
+          </a:fontRef>
+        </p:style>
+      </p:cxnSp>
+      <p:cxnSp>
+        <p:nvCxnSpPr>
+          <p:cNvPr id="22" name="Gerade Verbindung mit Pfeil 21">
+            <a:extLst>
+              <a:ext uri="{FF2B5EF4-FFF2-40B4-BE49-F238E27FC236}">
+                <a16:creationId xmlns:a16="http://schemas.microsoft.com/office/drawing/2014/main" id="{B2A8D8DB-4BE0-4826-7240-A4B871AAA452}"/>
+              </a:ext>
+            </a:extLst>
+          </p:cNvPr>
+          <p:cNvCxnSpPr>
+            <a:cxnSpLocks/>
+          </p:cNvCxnSpPr>
+          <p:nvPr/>
+        </p:nvCxnSpPr>
+        <p:spPr>
+          <a:xfrm>
+            <a:off x="1207150" y="2469987"/>
+            <a:ext cx="0" cy="810624"/>
+          </a:xfrm>
+          <a:prstGeom prst="straightConnector1">
+            <a:avLst/>
+          </a:prstGeom>
+          <a:ln w="28575">
+            <a:solidFill>
+              <a:schemeClr val="bg1">
+                <a:lumMod val="65000"/>
+              </a:schemeClr>
+            </a:solidFill>
+            <a:headEnd type="triangle" w="med" len="med"/>
+            <a:tailEnd type="triangle" w="med" len="med"/>
+          </a:ln>
+        </p:spPr>
+        <p:style>
+          <a:lnRef idx="1">
+            <a:schemeClr val="accent1"/>
+          </a:lnRef>
+          <a:fillRef idx="0">
+            <a:schemeClr val="accent1"/>
+          </a:fillRef>
+          <a:effectRef idx="0">
+            <a:schemeClr val="accent1"/>
+          </a:effectRef>
+          <a:fontRef idx="minor">
+            <a:schemeClr val="tx1"/>
+          </a:fontRef>
+        </p:style>
+      </p:cxnSp>
+      <p:cxnSp>
+        <p:nvCxnSpPr>
+          <p:cNvPr id="24" name="Gerade Verbindung mit Pfeil 23">
+            <a:extLst>
+              <a:ext uri="{FF2B5EF4-FFF2-40B4-BE49-F238E27FC236}">
+                <a16:creationId xmlns:a16="http://schemas.microsoft.com/office/drawing/2014/main" id="{0EE251D9-4602-7E08-213D-C6F40C1C5E9E}"/>
+              </a:ext>
+            </a:extLst>
+          </p:cNvPr>
+          <p:cNvCxnSpPr>
+            <a:cxnSpLocks/>
+          </p:cNvCxnSpPr>
+          <p:nvPr/>
+        </p:nvCxnSpPr>
+        <p:spPr>
+          <a:xfrm>
+            <a:off x="7173798" y="1451749"/>
+            <a:ext cx="630685" cy="0"/>
+          </a:xfrm>
+          <a:prstGeom prst="straightConnector1">
+            <a:avLst/>
+          </a:prstGeom>
+          <a:ln w="28575">
+            <a:solidFill>
+              <a:schemeClr val="bg1">
+                <a:lumMod val="65000"/>
+              </a:schemeClr>
+            </a:solidFill>
+            <a:tailEnd type="triangle"/>
+          </a:ln>
+        </p:spPr>
+        <p:style>
+          <a:lnRef idx="1">
+            <a:schemeClr val="accent1"/>
+          </a:lnRef>
+          <a:fillRef idx="0">
+            <a:schemeClr val="accent1"/>
+          </a:fillRef>
+          <a:effectRef idx="0">
+            <a:schemeClr val="accent1"/>
+          </a:effectRef>
+          <a:fontRef idx="minor">
+            <a:schemeClr val="tx1"/>
+          </a:fontRef>
+        </p:style>
+      </p:cxnSp>
+      <p:cxnSp>
+        <p:nvCxnSpPr>
+          <p:cNvPr id="25" name="Gerade Verbindung mit Pfeil 24">
+            <a:extLst>
+              <a:ext uri="{FF2B5EF4-FFF2-40B4-BE49-F238E27FC236}">
+                <a16:creationId xmlns:a16="http://schemas.microsoft.com/office/drawing/2014/main" id="{B92F8B78-4936-78BC-8224-FF1AD09B1395}"/>
+              </a:ext>
+            </a:extLst>
+          </p:cNvPr>
+          <p:cNvCxnSpPr>
+            <a:cxnSpLocks/>
+          </p:cNvCxnSpPr>
+          <p:nvPr/>
+        </p:nvCxnSpPr>
+        <p:spPr>
+          <a:xfrm>
+            <a:off x="5570694" y="4180453"/>
+            <a:ext cx="2038661" cy="0"/>
+          </a:xfrm>
+          <a:prstGeom prst="straightConnector1">
+            <a:avLst/>
+          </a:prstGeom>
+          <a:ln w="28575">
+            <a:solidFill>
+              <a:schemeClr val="bg1">
+                <a:lumMod val="65000"/>
+              </a:schemeClr>
+            </a:solidFill>
+            <a:tailEnd type="triangle"/>
+          </a:ln>
+        </p:spPr>
+        <p:style>
+          <a:lnRef idx="1">
+            <a:schemeClr val="accent1"/>
+          </a:lnRef>
+          <a:fillRef idx="0">
+            <a:schemeClr val="accent1"/>
+          </a:fillRef>
+          <a:effectRef idx="0">
+            <a:schemeClr val="accent1"/>
+          </a:effectRef>
+          <a:fontRef idx="minor">
+            <a:schemeClr val="tx1"/>
+          </a:fontRef>
+        </p:style>
+      </p:cxnSp>
+      <p:sp>
+        <p:nvSpPr>
+          <p:cNvPr id="27" name="Rechteck: abgerundete Ecken 26">
+            <a:extLst>
+              <a:ext uri="{FF2B5EF4-FFF2-40B4-BE49-F238E27FC236}">
+                <a16:creationId xmlns:a16="http://schemas.microsoft.com/office/drawing/2014/main" id="{B3642DD6-B0DC-442A-FCEE-CA4DE988BC2B}"/>
+              </a:ext>
+            </a:extLst>
+          </p:cNvPr>
+          <p:cNvSpPr/>
+          <p:nvPr/>
+        </p:nvSpPr>
+        <p:spPr>
+          <a:xfrm>
+            <a:off x="7804483" y="3545151"/>
+            <a:ext cx="3264564" cy="998776"/>
+          </a:xfrm>
+          <a:prstGeom prst="roundRect">
+            <a:avLst>
+              <a:gd name="adj" fmla="val 6303"/>
+            </a:avLst>
+          </a:prstGeom>
+        </p:spPr>
+        <p:style>
+          <a:lnRef idx="2">
+            <a:schemeClr val="dk1"/>
+          </a:lnRef>
+          <a:fillRef idx="1">
+            <a:schemeClr val="lt1"/>
+          </a:fillRef>
+          <a:effectRef idx="0">
+            <a:schemeClr val="dk1"/>
+          </a:effectRef>
+          <a:fontRef idx="minor">
+            <a:schemeClr val="dk1"/>
+          </a:fontRef>
+        </p:style>
+        <p:txBody>
+          <a:bodyPr wrap="square" rtlCol="0" anchor="ctr">
+            <a:spAutoFit/>
+          </a:bodyPr>
+          <a:lstStyle/>
+          <a:p>
+            <a:pPr algn="l">
+              <a:spcBef>
+                <a:spcPct val="50000"/>
+              </a:spcBef>
+            </a:pPr>
+            <a:endParaRPr lang="de-DE" b="1" dirty="0" err="1">
+              <a:solidFill>
+                <a:schemeClr val="tx1">
+                  <a:lumMod val="65000"/>
+                  <a:lumOff val="35000"/>
+                </a:schemeClr>
+              </a:solidFill>
+              <a:latin typeface="Courier New" panose="02070309020205020404" pitchFamily="49" charset="0"/>
+              <a:cs typeface="Courier New" panose="02070309020205020404" pitchFamily="49" charset="0"/>
+            </a:endParaRPr>
+          </a:p>
+        </p:txBody>
+      </p:sp>
+      <p:sp>
+        <p:nvSpPr>
+          <p:cNvPr id="28" name="Textfeld 27">
+            <a:extLst>
+              <a:ext uri="{FF2B5EF4-FFF2-40B4-BE49-F238E27FC236}">
+                <a16:creationId xmlns:a16="http://schemas.microsoft.com/office/drawing/2014/main" id="{6D5D594C-FC8D-1086-5CC1-2B9BDEBEECB4}"/>
+              </a:ext>
+            </a:extLst>
+          </p:cNvPr>
+          <p:cNvSpPr txBox="1"/>
+          <p:nvPr/>
+        </p:nvSpPr>
+        <p:spPr>
+          <a:xfrm>
+            <a:off x="7892988" y="3720021"/>
+            <a:ext cx="3235948" cy="669414"/>
+          </a:xfrm>
+          <a:prstGeom prst="rect">
+            <a:avLst/>
+          </a:prstGeom>
+          <a:noFill/>
+        </p:spPr>
+        <p:txBody>
+          <a:bodyPr wrap="square">
+            <a:spAutoFit/>
+          </a:bodyPr>
+          <a:lstStyle/>
+          <a:p>
+            <a:pPr algn="l" latinLnBrk="1">
+              <a:lnSpc>
+                <a:spcPts val="1470"/>
+              </a:lnSpc>
+              <a:buNone/>
+            </a:pPr>
+            <a:r>
+              <a:rPr lang="de-DE" sz="1400" b="1" dirty="0">
+                <a:latin typeface="Cascadia Code" panose="020B0609020000020004" pitchFamily="49" charset="0"/>
+                <a:ea typeface="ADLaM Display" panose="020F0502020204030204" pitchFamily="2" charset="0"/>
+                <a:cs typeface="Cascadia Code" panose="020B0609020000020004" pitchFamily="49" charset="0"/>
+              </a:rPr>
+              <a:t>ChatGPT </a:t>
+            </a:r>
+            <a:r>
+              <a:rPr lang="de-DE" sz="1400" b="1" dirty="0" err="1">
+                <a:latin typeface="Cascadia Code" panose="020B0609020000020004" pitchFamily="49" charset="0"/>
+                <a:ea typeface="ADLaM Display" panose="020F0502020204030204" pitchFamily="2" charset="0"/>
+                <a:cs typeface="Cascadia Code" panose="020B0609020000020004" pitchFamily="49" charset="0"/>
+              </a:rPr>
+              <a:t>server</a:t>
+            </a:r>
+            <a:br>
+              <a:rPr lang="de-DE" sz="1400" b="1" dirty="0">
+                <a:latin typeface="Cascadia Code" panose="020B0609020000020004" pitchFamily="49" charset="0"/>
+                <a:ea typeface="ADLaM Display" panose="020F0502020204030204" pitchFamily="2" charset="0"/>
+                <a:cs typeface="Cascadia Code" panose="020B0609020000020004" pitchFamily="49" charset="0"/>
+              </a:rPr>
+            </a:br>
+            <a:br>
+              <a:rPr lang="de-DE" sz="1400" b="1" dirty="0">
+                <a:latin typeface="Cascadia Code" panose="020B0609020000020004" pitchFamily="49" charset="0"/>
+                <a:ea typeface="ADLaM Display" panose="020F0502020204030204" pitchFamily="2" charset="0"/>
+                <a:cs typeface="Cascadia Code" panose="020B0609020000020004" pitchFamily="49" charset="0"/>
+              </a:rPr>
+            </a:br>
+            <a:r>
+              <a:rPr lang="de-DE" sz="1400" b="1" dirty="0" err="1">
+                <a:latin typeface="Cascadia Code" panose="020B0609020000020004" pitchFamily="49" charset="0"/>
+                <a:ea typeface="ADLaM Display" panose="020F0502020204030204" pitchFamily="2" charset="0"/>
+                <a:cs typeface="Cascadia Code" panose="020B0609020000020004" pitchFamily="49" charset="0"/>
+              </a:rPr>
+              <a:t>uses</a:t>
+            </a:r>
+            <a:r>
+              <a:rPr lang="de-DE" sz="1400" b="1" dirty="0">
+                <a:latin typeface="Cascadia Code" panose="020B0609020000020004" pitchFamily="49" charset="0"/>
+                <a:ea typeface="ADLaM Display" panose="020F0502020204030204" pitchFamily="2" charset="0"/>
+                <a:cs typeface="Cascadia Code" panose="020B0609020000020004" pitchFamily="49" charset="0"/>
+              </a:rPr>
+              <a:t> e.g. ChatGPT 5.1</a:t>
+            </a:r>
+          </a:p>
+        </p:txBody>
+      </p:sp>
+      <p:cxnSp>
+        <p:nvCxnSpPr>
+          <p:cNvPr id="32" name="Gerade Verbindung mit Pfeil 31">
+            <a:extLst>
+              <a:ext uri="{FF2B5EF4-FFF2-40B4-BE49-F238E27FC236}">
+                <a16:creationId xmlns:a16="http://schemas.microsoft.com/office/drawing/2014/main" id="{8380B97D-4A61-9173-49EB-AB53B0FCD863}"/>
+              </a:ext>
+            </a:extLst>
+          </p:cNvPr>
+          <p:cNvCxnSpPr>
+            <a:cxnSpLocks/>
+          </p:cNvCxnSpPr>
+          <p:nvPr/>
+        </p:nvCxnSpPr>
+        <p:spPr>
+          <a:xfrm flipV="1">
+            <a:off x="9339941" y="2875299"/>
+            <a:ext cx="0" cy="627682"/>
+          </a:xfrm>
+          <a:prstGeom prst="straightConnector1">
+            <a:avLst/>
+          </a:prstGeom>
+          <a:ln w="28575">
+            <a:solidFill>
+              <a:schemeClr val="bg1">
+                <a:lumMod val="65000"/>
+              </a:schemeClr>
+            </a:solidFill>
+            <a:tailEnd type="triangle"/>
+          </a:ln>
+        </p:spPr>
+        <p:style>
+          <a:lnRef idx="1">
+            <a:schemeClr val="accent1"/>
+          </a:lnRef>
+          <a:fillRef idx="0">
+            <a:schemeClr val="accent1"/>
+          </a:fillRef>
+          <a:effectRef idx="0">
+            <a:schemeClr val="accent1"/>
+          </a:effectRef>
+          <a:fontRef idx="minor">
+            <a:schemeClr val="tx1"/>
+          </a:fontRef>
+        </p:style>
+      </p:cxnSp>
+      <p:sp>
+        <p:nvSpPr>
+          <p:cNvPr id="34" name="Rechteck: abgerundete Ecken 33">
+            <a:extLst>
+              <a:ext uri="{FF2B5EF4-FFF2-40B4-BE49-F238E27FC236}">
+                <a16:creationId xmlns:a16="http://schemas.microsoft.com/office/drawing/2014/main" id="{F2907F93-A3E4-A634-B75A-DC9FC60F069B}"/>
+              </a:ext>
+            </a:extLst>
+          </p:cNvPr>
+          <p:cNvSpPr/>
+          <p:nvPr/>
+        </p:nvSpPr>
+        <p:spPr>
+          <a:xfrm>
+            <a:off x="7804483" y="5167345"/>
+            <a:ext cx="3264564" cy="998776"/>
+          </a:xfrm>
+          <a:prstGeom prst="roundRect">
+            <a:avLst>
+              <a:gd name="adj" fmla="val 6303"/>
+            </a:avLst>
+          </a:prstGeom>
+        </p:spPr>
+        <p:style>
+          <a:lnRef idx="2">
+            <a:schemeClr val="dk1"/>
+          </a:lnRef>
+          <a:fillRef idx="1">
+            <a:schemeClr val="lt1"/>
+          </a:fillRef>
+          <a:effectRef idx="0">
+            <a:schemeClr val="dk1"/>
+          </a:effectRef>
+          <a:fontRef idx="minor">
+            <a:schemeClr val="dk1"/>
+          </a:fontRef>
+        </p:style>
+        <p:txBody>
+          <a:bodyPr wrap="square" rtlCol="0" anchor="ctr">
+            <a:spAutoFit/>
+          </a:bodyPr>
+          <a:lstStyle/>
+          <a:p>
+            <a:pPr algn="l">
+              <a:spcBef>
+                <a:spcPct val="50000"/>
+              </a:spcBef>
+            </a:pPr>
+            <a:endParaRPr lang="de-DE" b="1" dirty="0" err="1">
+              <a:solidFill>
+                <a:schemeClr val="tx1">
+                  <a:lumMod val="65000"/>
+                  <a:lumOff val="35000"/>
+                </a:schemeClr>
+              </a:solidFill>
+              <a:latin typeface="Courier New" panose="02070309020205020404" pitchFamily="49" charset="0"/>
+              <a:cs typeface="Courier New" panose="02070309020205020404" pitchFamily="49" charset="0"/>
+            </a:endParaRPr>
+          </a:p>
+        </p:txBody>
+      </p:sp>
+      <p:sp>
+        <p:nvSpPr>
+          <p:cNvPr id="35" name="Textfeld 34">
+            <a:extLst>
+              <a:ext uri="{FF2B5EF4-FFF2-40B4-BE49-F238E27FC236}">
+                <a16:creationId xmlns:a16="http://schemas.microsoft.com/office/drawing/2014/main" id="{76B20615-DA4D-F5CB-8D26-7E45D5B834C8}"/>
+              </a:ext>
+            </a:extLst>
+          </p:cNvPr>
+          <p:cNvSpPr txBox="1"/>
+          <p:nvPr/>
+        </p:nvSpPr>
+        <p:spPr>
+          <a:xfrm>
+            <a:off x="8897625" y="5521501"/>
+            <a:ext cx="1226675" cy="290464"/>
+          </a:xfrm>
+          <a:prstGeom prst="rect">
+            <a:avLst/>
+          </a:prstGeom>
+          <a:noFill/>
+        </p:spPr>
+        <p:txBody>
+          <a:bodyPr wrap="square">
+            <a:spAutoFit/>
+          </a:bodyPr>
+          <a:lstStyle/>
+          <a:p>
+            <a:pPr algn="l" latinLnBrk="1">
+              <a:lnSpc>
+                <a:spcPts val="1470"/>
+              </a:lnSpc>
+              <a:buNone/>
+            </a:pPr>
+            <a:r>
+              <a:rPr lang="de-DE" sz="1400" b="1" dirty="0" err="1">
+                <a:latin typeface="Cascadia Code" panose="020B0609020000020004" pitchFamily="49" charset="0"/>
+                <a:ea typeface="ADLaM Display" panose="020F0502020204030204" pitchFamily="2" charset="0"/>
+                <a:cs typeface="Cascadia Code" panose="020B0609020000020004" pitchFamily="49" charset="0"/>
+              </a:rPr>
+              <a:t>internet</a:t>
+            </a:r>
+            <a:endParaRPr lang="de-DE" sz="1400" b="1" dirty="0">
+              <a:latin typeface="Cascadia Code" panose="020B0609020000020004" pitchFamily="49" charset="0"/>
+              <a:ea typeface="ADLaM Display" panose="020F0502020204030204" pitchFamily="2" charset="0"/>
+              <a:cs typeface="Cascadia Code" panose="020B0609020000020004" pitchFamily="49" charset="0"/>
+            </a:endParaRPr>
+          </a:p>
+        </p:txBody>
+      </p:sp>
+      <p:cxnSp>
+        <p:nvCxnSpPr>
+          <p:cNvPr id="36" name="Gerade Verbindung mit Pfeil 35">
+            <a:extLst>
+              <a:ext uri="{FF2B5EF4-FFF2-40B4-BE49-F238E27FC236}">
+                <a16:creationId xmlns:a16="http://schemas.microsoft.com/office/drawing/2014/main" id="{8DE7BAF5-154F-51CF-1BC3-5E16BF0F95E2}"/>
+              </a:ext>
+            </a:extLst>
+          </p:cNvPr>
+          <p:cNvCxnSpPr>
+            <a:cxnSpLocks/>
+          </p:cNvCxnSpPr>
+          <p:nvPr/>
+        </p:nvCxnSpPr>
+        <p:spPr>
+          <a:xfrm>
+            <a:off x="9333882" y="4708358"/>
+            <a:ext cx="0" cy="358549"/>
+          </a:xfrm>
+          <a:prstGeom prst="straightConnector1">
+            <a:avLst/>
+          </a:prstGeom>
+          <a:ln w="28575">
+            <a:solidFill>
+              <a:schemeClr val="bg1">
+                <a:lumMod val="65000"/>
+              </a:schemeClr>
+            </a:solidFill>
+            <a:tailEnd type="triangle"/>
+          </a:ln>
+        </p:spPr>
+        <p:style>
+          <a:lnRef idx="1">
+            <a:schemeClr val="accent1"/>
+          </a:lnRef>
+          <a:fillRef idx="0">
+            <a:schemeClr val="accent1"/>
+          </a:fillRef>
+          <a:effectRef idx="0">
+            <a:schemeClr val="accent1"/>
+          </a:effectRef>
+          <a:fontRef idx="minor">
+            <a:schemeClr val="tx1"/>
+          </a:fontRef>
+        </p:style>
+      </p:cxnSp>
+      <p:sp>
+        <p:nvSpPr>
+          <p:cNvPr id="43" name="Textfeld 42">
+            <a:extLst>
+              <a:ext uri="{FF2B5EF4-FFF2-40B4-BE49-F238E27FC236}">
+                <a16:creationId xmlns:a16="http://schemas.microsoft.com/office/drawing/2014/main" id="{331167AB-3385-41F6-12BB-1E98B03D82AD}"/>
+              </a:ext>
+            </a:extLst>
+          </p:cNvPr>
+          <p:cNvSpPr txBox="1"/>
+          <p:nvPr/>
+        </p:nvSpPr>
+        <p:spPr>
+          <a:xfrm>
+            <a:off x="8460556" y="489373"/>
+            <a:ext cx="2839185" cy="290464"/>
+          </a:xfrm>
+          <a:prstGeom prst="rect">
+            <a:avLst/>
+          </a:prstGeom>
+          <a:noFill/>
+        </p:spPr>
+        <p:txBody>
+          <a:bodyPr wrap="square">
+            <a:spAutoFit/>
+          </a:bodyPr>
+          <a:lstStyle/>
+          <a:p>
+            <a:pPr latinLnBrk="1">
+              <a:lnSpc>
+                <a:spcPts val="1470"/>
+              </a:lnSpc>
+            </a:pPr>
+            <a:r>
+              <a:rPr lang="de-DE" sz="1400" b="1" dirty="0">
+                <a:latin typeface="Cascadia Code" panose="020B0609020000020004" pitchFamily="49" charset="0"/>
+                <a:ea typeface="ADLaM Display" panose="020F0502020204030204" pitchFamily="2" charset="0"/>
+                <a:cs typeface="Cascadia Code" panose="020B0609020000020004" pitchFamily="49" charset="0"/>
+              </a:rPr>
+              <a:t>NO personal </a:t>
+            </a:r>
+            <a:r>
+              <a:rPr lang="de-DE" sz="1400" b="1" dirty="0" err="1">
+                <a:latin typeface="Cascadia Code" panose="020B0609020000020004" pitchFamily="49" charset="0"/>
+                <a:ea typeface="ADLaM Display" panose="020F0502020204030204" pitchFamily="2" charset="0"/>
+                <a:cs typeface="Cascadia Code" panose="020B0609020000020004" pitchFamily="49" charset="0"/>
+              </a:rPr>
+              <a:t>data</a:t>
+            </a:r>
+            <a:endParaRPr lang="de-DE" sz="1400" b="1" dirty="0">
+              <a:latin typeface="Cascadia Code" panose="020B0609020000020004" pitchFamily="49" charset="0"/>
+              <a:ea typeface="ADLaM Display" panose="020F0502020204030204" pitchFamily="2" charset="0"/>
+              <a:cs typeface="Cascadia Code" panose="020B0609020000020004" pitchFamily="49" charset="0"/>
+            </a:endParaRPr>
+          </a:p>
+        </p:txBody>
+      </p:sp>
+      <p:sp>
+        <p:nvSpPr>
+          <p:cNvPr id="44" name="Textfeld 43">
+            <a:extLst>
+              <a:ext uri="{FF2B5EF4-FFF2-40B4-BE49-F238E27FC236}">
+                <a16:creationId xmlns:a16="http://schemas.microsoft.com/office/drawing/2014/main" id="{1B37357B-C27C-81A8-11A6-853B5996A1E3}"/>
+              </a:ext>
+            </a:extLst>
+          </p:cNvPr>
+          <p:cNvSpPr txBox="1"/>
+          <p:nvPr/>
+        </p:nvSpPr>
+        <p:spPr>
+          <a:xfrm>
+            <a:off x="8130149" y="2399530"/>
+            <a:ext cx="3235948" cy="290464"/>
+          </a:xfrm>
+          <a:prstGeom prst="rect">
+            <a:avLst/>
+          </a:prstGeom>
+          <a:noFill/>
+        </p:spPr>
+        <p:txBody>
+          <a:bodyPr wrap="square">
+            <a:spAutoFit/>
+          </a:bodyPr>
+          <a:lstStyle/>
+          <a:p>
+            <a:pPr latinLnBrk="1">
+              <a:lnSpc>
+                <a:spcPts val="1470"/>
+              </a:lnSpc>
+              <a:buNone/>
+            </a:pPr>
+            <a:r>
+              <a:rPr lang="de-DE" sz="1400" b="1" dirty="0" err="1">
+                <a:latin typeface="Cascadia Code" panose="020B0609020000020004" pitchFamily="49" charset="0"/>
+                <a:ea typeface="ADLaM Display" panose="020F0502020204030204" pitchFamily="2" charset="0"/>
+                <a:cs typeface="Cascadia Code" panose="020B0609020000020004" pitchFamily="49" charset="0"/>
+              </a:rPr>
+              <a:t>only</a:t>
+            </a:r>
+            <a:r>
+              <a:rPr lang="de-DE" sz="1400" b="1" dirty="0">
+                <a:latin typeface="Cascadia Code" panose="020B0609020000020004" pitchFamily="49" charset="0"/>
+                <a:ea typeface="ADLaM Display" panose="020F0502020204030204" pitchFamily="2" charset="0"/>
+                <a:cs typeface="Cascadia Code" panose="020B0609020000020004" pitchFamily="49" charset="0"/>
+              </a:rPr>
+              <a:t> pseudonym </a:t>
+            </a:r>
+            <a:r>
+              <a:rPr lang="de-DE" sz="1400" b="1" dirty="0" err="1">
+                <a:latin typeface="Cascadia Code" panose="020B0609020000020004" pitchFamily="49" charset="0"/>
+                <a:ea typeface="ADLaM Display" panose="020F0502020204030204" pitchFamily="2" charset="0"/>
+                <a:cs typeface="Cascadia Code" panose="020B0609020000020004" pitchFamily="49" charset="0"/>
+              </a:rPr>
+              <a:t>SkillPilot</a:t>
+            </a:r>
+            <a:r>
+              <a:rPr lang="de-DE" sz="1400" b="1" dirty="0">
+                <a:latin typeface="Cascadia Code" panose="020B0609020000020004" pitchFamily="49" charset="0"/>
+                <a:ea typeface="ADLaM Display" panose="020F0502020204030204" pitchFamily="2" charset="0"/>
+                <a:cs typeface="Cascadia Code" panose="020B0609020000020004" pitchFamily="49" charset="0"/>
+              </a:rPr>
+              <a:t>-ID</a:t>
+            </a:r>
+          </a:p>
+        </p:txBody>
+      </p:sp>
+      <p:sp>
+        <p:nvSpPr>
+          <p:cNvPr id="46" name="Textfeld 45">
+            <a:extLst>
+              <a:ext uri="{FF2B5EF4-FFF2-40B4-BE49-F238E27FC236}">
+                <a16:creationId xmlns:a16="http://schemas.microsoft.com/office/drawing/2014/main" id="{17AC7A66-FBC2-842C-EDDA-BCCAE80EADB3}"/>
+              </a:ext>
+            </a:extLst>
+          </p:cNvPr>
+          <p:cNvSpPr txBox="1"/>
+          <p:nvPr/>
+        </p:nvSpPr>
+        <p:spPr>
+          <a:xfrm>
+            <a:off x="3250498" y="6030785"/>
+            <a:ext cx="4733326" cy="477054"/>
+          </a:xfrm>
+          <a:prstGeom prst="rect">
+            <a:avLst/>
+          </a:prstGeom>
+          <a:noFill/>
+        </p:spPr>
+        <p:txBody>
+          <a:bodyPr wrap="square">
+            <a:spAutoFit/>
+          </a:bodyPr>
+          <a:lstStyle/>
+          <a:p>
+            <a:pPr algn="l" latinLnBrk="1">
+              <a:lnSpc>
+                <a:spcPts val="1470"/>
+              </a:lnSpc>
+              <a:buNone/>
+            </a:pPr>
+            <a:r>
+              <a:rPr lang="de-DE" sz="1400" b="1" dirty="0">
+                <a:latin typeface="Cascadia Code" panose="020B0609020000020004" pitchFamily="49" charset="0"/>
+                <a:ea typeface="ADLaM Display" panose="020F0502020204030204" pitchFamily="2" charset="0"/>
+                <a:cs typeface="Cascadia Code" panose="020B0609020000020004" pitchFamily="49" charset="0"/>
+              </a:rPr>
+              <a:t>ChatGPT </a:t>
+            </a:r>
+            <a:r>
+              <a:rPr lang="de-DE" sz="1400" b="1" dirty="0" err="1">
+                <a:latin typeface="Cascadia Code" panose="020B0609020000020004" pitchFamily="49" charset="0"/>
+                <a:ea typeface="ADLaM Display" panose="020F0502020204030204" pitchFamily="2" charset="0"/>
+                <a:cs typeface="Cascadia Code" panose="020B0609020000020004" pitchFamily="49" charset="0"/>
+              </a:rPr>
+              <a:t>based</a:t>
+            </a:r>
+            <a:r>
+              <a:rPr lang="de-DE" sz="1400" b="1" dirty="0">
+                <a:latin typeface="Cascadia Code" panose="020B0609020000020004" pitchFamily="49" charset="0"/>
+                <a:ea typeface="ADLaM Display" panose="020F0502020204030204" pitchFamily="2" charset="0"/>
+                <a:cs typeface="Cascadia Code" panose="020B0609020000020004" pitchFamily="49" charset="0"/>
+              </a:rPr>
+              <a:t> </a:t>
+            </a:r>
+            <a:r>
+              <a:rPr lang="de-DE" sz="1400" b="1" dirty="0" err="1">
+                <a:latin typeface="Cascadia Code" panose="020B0609020000020004" pitchFamily="49" charset="0"/>
+                <a:ea typeface="ADLaM Display" panose="020F0502020204030204" pitchFamily="2" charset="0"/>
+                <a:cs typeface="Cascadia Code" panose="020B0609020000020004" pitchFamily="49" charset="0"/>
+              </a:rPr>
+              <a:t>tutor</a:t>
+            </a:r>
+            <a:r>
+              <a:rPr lang="de-DE" sz="1400" b="1" dirty="0">
+                <a:latin typeface="Cascadia Code" panose="020B0609020000020004" pitchFamily="49" charset="0"/>
+                <a:ea typeface="ADLaM Display" panose="020F0502020204030204" pitchFamily="2" charset="0"/>
+                <a:cs typeface="Cascadia Code" panose="020B0609020000020004" pitchFamily="49" charset="0"/>
+              </a:rPr>
+              <a:t>, </a:t>
+            </a:r>
+            <a:br>
+              <a:rPr lang="de-DE" sz="1400" b="1" dirty="0">
+                <a:latin typeface="Cascadia Code" panose="020B0609020000020004" pitchFamily="49" charset="0"/>
+                <a:ea typeface="ADLaM Display" panose="020F0502020204030204" pitchFamily="2" charset="0"/>
+                <a:cs typeface="Cascadia Code" panose="020B0609020000020004" pitchFamily="49" charset="0"/>
+              </a:rPr>
+            </a:br>
+            <a:r>
+              <a:rPr lang="de-DE" sz="1400" b="1" dirty="0" err="1">
+                <a:latin typeface="Cascadia Code" panose="020B0609020000020004" pitchFamily="49" charset="0"/>
+                <a:ea typeface="ADLaM Display" panose="020F0502020204030204" pitchFamily="2" charset="0"/>
+                <a:cs typeface="Cascadia Code" panose="020B0609020000020004" pitchFamily="49" charset="0"/>
+              </a:rPr>
+              <a:t>accessing</a:t>
+            </a:r>
+            <a:r>
+              <a:rPr lang="de-DE" sz="1400" b="1" dirty="0">
+                <a:latin typeface="Cascadia Code" panose="020B0609020000020004" pitchFamily="49" charset="0"/>
+                <a:ea typeface="ADLaM Display" panose="020F0502020204030204" pitchFamily="2" charset="0"/>
+                <a:cs typeface="Cascadia Code" panose="020B0609020000020004" pitchFamily="49" charset="0"/>
+              </a:rPr>
+              <a:t> </a:t>
+            </a:r>
+            <a:r>
+              <a:rPr lang="de-DE" sz="1400" b="1" dirty="0" err="1">
+                <a:latin typeface="Cascadia Code" panose="020B0609020000020004" pitchFamily="49" charset="0"/>
+                <a:ea typeface="ADLaM Display" panose="020F0502020204030204" pitchFamily="2" charset="0"/>
+                <a:cs typeface="Cascadia Code" panose="020B0609020000020004" pitchFamily="49" charset="0"/>
+              </a:rPr>
+              <a:t>SkillPilot</a:t>
+            </a:r>
+            <a:r>
+              <a:rPr lang="de-DE" sz="1400" b="1" dirty="0">
+                <a:latin typeface="Cascadia Code" panose="020B0609020000020004" pitchFamily="49" charset="0"/>
+                <a:ea typeface="ADLaM Display" panose="020F0502020204030204" pitchFamily="2" charset="0"/>
+                <a:cs typeface="Cascadia Code" panose="020B0609020000020004" pitchFamily="49" charset="0"/>
+              </a:rPr>
+              <a:t> </a:t>
+            </a:r>
+            <a:r>
+              <a:rPr lang="de-DE" sz="1400" b="1" dirty="0" err="1">
+                <a:latin typeface="Cascadia Code" panose="020B0609020000020004" pitchFamily="49" charset="0"/>
+                <a:ea typeface="ADLaM Display" panose="020F0502020204030204" pitchFamily="2" charset="0"/>
+                <a:cs typeface="Cascadia Code" panose="020B0609020000020004" pitchFamily="49" charset="0"/>
+              </a:rPr>
+              <a:t>server</a:t>
+            </a:r>
+            <a:endParaRPr lang="de-DE" sz="1400" b="1" dirty="0">
+              <a:latin typeface="Cascadia Code" panose="020B0609020000020004" pitchFamily="49" charset="0"/>
+              <a:ea typeface="ADLaM Display" panose="020F0502020204030204" pitchFamily="2" charset="0"/>
+              <a:cs typeface="Cascadia Code" panose="020B0609020000020004" pitchFamily="49" charset="0"/>
+            </a:endParaRPr>
+          </a:p>
+        </p:txBody>
+      </p:sp>
+      <p:pic>
+        <p:nvPicPr>
+          <p:cNvPr id="37" name="Grafik 36" descr="Server Silhouette">
+            <a:extLst>
+              <a:ext uri="{FF2B5EF4-FFF2-40B4-BE49-F238E27FC236}">
+                <a16:creationId xmlns:a16="http://schemas.microsoft.com/office/drawing/2014/main" id="{8FC0C145-71E1-1820-4D81-52E15E89CD83}"/>
+              </a:ext>
+            </a:extLst>
+          </p:cNvPr>
+          <p:cNvPicPr>
+            <a:picLocks noChangeAspect="1"/>
+          </p:cNvPicPr>
+          <p:nvPr/>
+        </p:nvPicPr>
+        <p:blipFill>
+          <a:blip r:embed="rId2">
+            <a:extLst>
+              <a:ext uri="{96DAC541-7B7A-43D3-8B79-37D633B846F1}">
+                <asvg:svgBlip xmlns:asvg="http://schemas.microsoft.com/office/drawing/2016/SVG/main" r:embed="rId3"/>
+              </a:ext>
+            </a:extLst>
+          </a:blip>
+          <a:stretch>
+            <a:fillRect/>
+          </a:stretch>
+        </p:blipFill>
+        <p:spPr>
+          <a:xfrm>
+            <a:off x="10011321" y="1209507"/>
+            <a:ext cx="914400" cy="914400"/>
+          </a:xfrm>
+          <a:prstGeom prst="rect">
+            <a:avLst/>
+          </a:prstGeom>
+        </p:spPr>
+      </p:pic>
+      <p:pic>
+        <p:nvPicPr>
+          <p:cNvPr id="39" name="Grafik 38" descr="Verwirrte Person Silhouette">
+            <a:extLst>
+              <a:ext uri="{FF2B5EF4-FFF2-40B4-BE49-F238E27FC236}">
+                <a16:creationId xmlns:a16="http://schemas.microsoft.com/office/drawing/2014/main" id="{8704426B-056C-114F-F8A3-054DBE1032C9}"/>
+              </a:ext>
+            </a:extLst>
+          </p:cNvPr>
+          <p:cNvPicPr>
+            <a:picLocks noChangeAspect="1"/>
+          </p:cNvPicPr>
+          <p:nvPr/>
+        </p:nvPicPr>
+        <p:blipFill>
+          <a:blip r:embed="rId4">
+            <a:extLst>
+              <a:ext uri="{96DAC541-7B7A-43D3-8B79-37D633B846F1}">
+                <asvg:svgBlip xmlns:asvg="http://schemas.microsoft.com/office/drawing/2016/SVG/main" r:embed="rId5"/>
+              </a:ext>
+            </a:extLst>
+          </a:blip>
+          <a:stretch>
+            <a:fillRect/>
+          </a:stretch>
+        </p:blipFill>
+        <p:spPr>
+          <a:xfrm>
+            <a:off x="664016" y="614341"/>
+            <a:ext cx="1185758" cy="1185758"/>
+          </a:xfrm>
+          <a:prstGeom prst="rect">
+            <a:avLst/>
+          </a:prstGeom>
+        </p:spPr>
+      </p:pic>
+      <p:pic>
+        <p:nvPicPr>
+          <p:cNvPr id="41" name="Grafik 40" descr="Verwirrte Person Silhouette">
+            <a:extLst>
+              <a:ext uri="{FF2B5EF4-FFF2-40B4-BE49-F238E27FC236}">
+                <a16:creationId xmlns:a16="http://schemas.microsoft.com/office/drawing/2014/main" id="{AA8DD9D9-CB8B-B79A-7B69-3F04D0E162F6}"/>
+              </a:ext>
+            </a:extLst>
+          </p:cNvPr>
+          <p:cNvPicPr>
+            <a:picLocks noChangeAspect="1"/>
+          </p:cNvPicPr>
+          <p:nvPr/>
+        </p:nvPicPr>
+        <p:blipFill>
+          <a:blip r:embed="rId4">
+            <a:extLst>
+              <a:ext uri="{96DAC541-7B7A-43D3-8B79-37D633B846F1}">
+                <asvg:svgBlip xmlns:asvg="http://schemas.microsoft.com/office/drawing/2016/SVG/main" r:embed="rId5"/>
+              </a:ext>
+            </a:extLst>
+          </a:blip>
+          <a:stretch>
+            <a:fillRect/>
+          </a:stretch>
+        </p:blipFill>
+        <p:spPr>
+          <a:xfrm>
+            <a:off x="664016" y="3505558"/>
+            <a:ext cx="1185758" cy="1185758"/>
+          </a:xfrm>
+          <a:prstGeom prst="rect">
+            <a:avLst/>
+          </a:prstGeom>
+        </p:spPr>
+      </p:pic>
+      <p:cxnSp>
+        <p:nvCxnSpPr>
+          <p:cNvPr id="47" name="Gerade Verbindung mit Pfeil 46">
+            <a:extLst>
+              <a:ext uri="{FF2B5EF4-FFF2-40B4-BE49-F238E27FC236}">
+                <a16:creationId xmlns:a16="http://schemas.microsoft.com/office/drawing/2014/main" id="{43EB5AEB-5B8A-1383-A8C9-CBA0C45D868A}"/>
+              </a:ext>
+            </a:extLst>
+          </p:cNvPr>
+          <p:cNvCxnSpPr>
+            <a:cxnSpLocks/>
+          </p:cNvCxnSpPr>
+          <p:nvPr/>
+        </p:nvCxnSpPr>
+        <p:spPr>
+          <a:xfrm>
+            <a:off x="409042" y="6002318"/>
+            <a:ext cx="708035" cy="0"/>
+          </a:xfrm>
+          <a:prstGeom prst="straightConnector1">
+            <a:avLst/>
+          </a:prstGeom>
+          <a:ln w="28575">
+            <a:solidFill>
+              <a:schemeClr val="bg1">
+                <a:lumMod val="65000"/>
+              </a:schemeClr>
+            </a:solidFill>
+            <a:tailEnd type="triangle"/>
+          </a:ln>
+        </p:spPr>
+        <p:style>
+          <a:lnRef idx="1">
+            <a:schemeClr val="accent1"/>
+          </a:lnRef>
+          <a:fillRef idx="0">
+            <a:schemeClr val="accent1"/>
+          </a:fillRef>
+          <a:effectRef idx="0">
+            <a:schemeClr val="accent1"/>
+          </a:effectRef>
+          <a:fontRef idx="minor">
+            <a:schemeClr val="tx1"/>
+          </a:fontRef>
+        </p:style>
+      </p:cxnSp>
+      <p:sp>
+        <p:nvSpPr>
+          <p:cNvPr id="49" name="Textfeld 48">
+            <a:extLst>
+              <a:ext uri="{FF2B5EF4-FFF2-40B4-BE49-F238E27FC236}">
+                <a16:creationId xmlns:a16="http://schemas.microsoft.com/office/drawing/2014/main" id="{D949EA90-2D9D-5882-AB71-01BD63D7C17D}"/>
+              </a:ext>
+            </a:extLst>
+          </p:cNvPr>
+          <p:cNvSpPr txBox="1"/>
+          <p:nvPr/>
+        </p:nvSpPr>
+        <p:spPr>
+          <a:xfrm>
+            <a:off x="176106" y="6116976"/>
+            <a:ext cx="2548240" cy="477054"/>
+          </a:xfrm>
+          <a:prstGeom prst="rect">
+            <a:avLst/>
+          </a:prstGeom>
+          <a:noFill/>
+        </p:spPr>
+        <p:txBody>
+          <a:bodyPr wrap="square">
+            <a:spAutoFit/>
+          </a:bodyPr>
+          <a:lstStyle/>
+          <a:p>
+            <a:pPr algn="l" latinLnBrk="1">
+              <a:lnSpc>
+                <a:spcPts val="1470"/>
+              </a:lnSpc>
+              <a:buNone/>
+            </a:pPr>
+            <a:r>
+              <a:rPr lang="de-DE" sz="1400" b="1" dirty="0" err="1">
+                <a:latin typeface="Cascadia Code" panose="020B0609020000020004" pitchFamily="49" charset="0"/>
+                <a:ea typeface="ADLaM Display" panose="020F0502020204030204" pitchFamily="2" charset="0"/>
+                <a:cs typeface="Cascadia Code" panose="020B0609020000020004" pitchFamily="49" charset="0"/>
+              </a:rPr>
+              <a:t>arrow</a:t>
+            </a:r>
+            <a:r>
+              <a:rPr lang="de-DE" sz="1400" b="1" dirty="0">
+                <a:latin typeface="Cascadia Code" panose="020B0609020000020004" pitchFamily="49" charset="0"/>
+                <a:ea typeface="ADLaM Display" panose="020F0502020204030204" pitchFamily="2" charset="0"/>
+                <a:cs typeface="Cascadia Code" panose="020B0609020000020004" pitchFamily="49" charset="0"/>
+              </a:rPr>
+              <a:t> </a:t>
+            </a:r>
+            <a:r>
+              <a:rPr lang="en-US" sz="1400" b="1" dirty="0">
+                <a:latin typeface="Cascadia Code" panose="020B0609020000020004" pitchFamily="49" charset="0"/>
+                <a:ea typeface="ADLaM Display" panose="020F0502020204030204" pitchFamily="2" charset="0"/>
+                <a:cs typeface="Cascadia Code" panose="020B0609020000020004" pitchFamily="49" charset="0"/>
+              </a:rPr>
+              <a:t>in the direction of initiation</a:t>
+            </a:r>
+            <a:endParaRPr lang="de-DE" sz="1400" b="1" dirty="0">
+              <a:latin typeface="Cascadia Code" panose="020B0609020000020004" pitchFamily="49" charset="0"/>
+              <a:ea typeface="ADLaM Display" panose="020F0502020204030204" pitchFamily="2" charset="0"/>
+              <a:cs typeface="Cascadia Code" panose="020B0609020000020004" pitchFamily="49" charset="0"/>
+            </a:endParaRPr>
+          </a:p>
+        </p:txBody>
+      </p:sp>
+      <p:pic>
+        <p:nvPicPr>
+          <p:cNvPr id="51" name="Grafik 50" descr="Ein Bild, das gelb, Dreieck, Stern enthält.&#10;&#10;KI-generierte Inhalte können fehlerhaft sein.">
+            <a:extLst>
+              <a:ext uri="{FF2B5EF4-FFF2-40B4-BE49-F238E27FC236}">
+                <a16:creationId xmlns:a16="http://schemas.microsoft.com/office/drawing/2014/main" id="{877D8D1A-7034-4F6C-B740-E36575D66EE3}"/>
+              </a:ext>
+            </a:extLst>
+          </p:cNvPr>
+          <p:cNvPicPr>
+            <a:picLocks noChangeAspect="1"/>
+          </p:cNvPicPr>
+          <p:nvPr/>
+        </p:nvPicPr>
+        <p:blipFill>
+          <a:blip r:embed="rId6" cstate="print">
+            <a:extLst>
+              <a:ext uri="{28A0092B-C50C-407E-A947-70E740481C1C}">
+                <a14:useLocalDpi xmlns:a14="http://schemas.microsoft.com/office/drawing/2010/main" val="0"/>
+              </a:ext>
+            </a:extLst>
+          </a:blip>
+          <a:stretch>
+            <a:fillRect/>
+          </a:stretch>
+        </p:blipFill>
+        <p:spPr>
+          <a:xfrm>
+            <a:off x="3245138" y="4532519"/>
+            <a:ext cx="983952" cy="983952"/>
+          </a:xfrm>
+          <a:prstGeom prst="rect">
+            <a:avLst/>
+          </a:prstGeom>
+        </p:spPr>
+      </p:pic>
+      <p:pic>
+        <p:nvPicPr>
+          <p:cNvPr id="53" name="Grafik 52">
+            <a:extLst>
+              <a:ext uri="{FF2B5EF4-FFF2-40B4-BE49-F238E27FC236}">
+                <a16:creationId xmlns:a16="http://schemas.microsoft.com/office/drawing/2014/main" id="{66F07196-B2B5-1DEE-9A37-9A35836F8EBC}"/>
+              </a:ext>
+            </a:extLst>
+          </p:cNvPr>
+          <p:cNvPicPr>
+            <a:picLocks noChangeAspect="1"/>
+          </p:cNvPicPr>
+          <p:nvPr/>
+        </p:nvPicPr>
+        <p:blipFill>
+          <a:blip r:embed="rId7">
+            <a:extLst>
+              <a:ext uri="{96DAC541-7B7A-43D3-8B79-37D633B846F1}">
+                <asvg:svgBlip xmlns:asvg="http://schemas.microsoft.com/office/drawing/2016/SVG/main" r:embed="rId8"/>
+              </a:ext>
+            </a:extLst>
+          </a:blip>
+          <a:stretch>
+            <a:fillRect/>
+          </a:stretch>
+        </p:blipFill>
+        <p:spPr>
+          <a:xfrm>
+            <a:off x="4099110" y="3636900"/>
+            <a:ext cx="1123248" cy="1123248"/>
+          </a:xfrm>
+          <a:prstGeom prst="rect">
+            <a:avLst/>
+          </a:prstGeom>
+        </p:spPr>
+      </p:pic>
+      <p:pic>
+        <p:nvPicPr>
+          <p:cNvPr id="3" name="Grafik 2">
+            <a:extLst>
+              <a:ext uri="{FF2B5EF4-FFF2-40B4-BE49-F238E27FC236}">
+                <a16:creationId xmlns:a16="http://schemas.microsoft.com/office/drawing/2014/main" id="{8A1F413C-DBCB-BEFF-EFB9-1EC317228DA4}"/>
+              </a:ext>
+            </a:extLst>
+          </p:cNvPr>
+          <p:cNvPicPr>
+            <a:picLocks noChangeAspect="1"/>
+          </p:cNvPicPr>
+          <p:nvPr/>
+        </p:nvPicPr>
+        <p:blipFill>
+          <a:blip r:embed="rId9"/>
+          <a:stretch>
+            <a:fillRect/>
+          </a:stretch>
+        </p:blipFill>
+        <p:spPr>
+          <a:xfrm>
+            <a:off x="3120723" y="344094"/>
+            <a:ext cx="3794959" cy="2016072"/>
+          </a:xfrm>
+          <a:prstGeom prst="rect">
+            <a:avLst/>
+          </a:prstGeom>
+          <a:ln>
+            <a:solidFill>
+              <a:schemeClr val="bg1">
+                <a:lumMod val="75000"/>
+              </a:schemeClr>
+            </a:solidFill>
+          </a:ln>
+        </p:spPr>
+      </p:pic>
+      <p:pic>
+        <p:nvPicPr>
+          <p:cNvPr id="12" name="Grafik 11" descr="Zeitung Silhouette">
+            <a:extLst>
+              <a:ext uri="{FF2B5EF4-FFF2-40B4-BE49-F238E27FC236}">
+                <a16:creationId xmlns:a16="http://schemas.microsoft.com/office/drawing/2014/main" id="{6BD1BF22-97A5-05AE-4D65-09E8924B3534}"/>
+              </a:ext>
+            </a:extLst>
+          </p:cNvPr>
+          <p:cNvPicPr>
+            <a:picLocks noChangeAspect="1"/>
+          </p:cNvPicPr>
+          <p:nvPr/>
+        </p:nvPicPr>
+        <p:blipFill>
+          <a:blip r:embed="rId10">
+            <a:extLst>
+              <a:ext uri="{96DAC541-7B7A-43D3-8B79-37D633B846F1}">
+                <asvg:svgBlip xmlns:asvg="http://schemas.microsoft.com/office/drawing/2016/SVG/main" r:embed="rId11"/>
+              </a:ext>
+            </a:extLst>
+          </a:blip>
+          <a:stretch>
+            <a:fillRect/>
+          </a:stretch>
+        </p:blipFill>
+        <p:spPr>
+          <a:xfrm>
+            <a:off x="1873262" y="178978"/>
+            <a:ext cx="678455" cy="678455"/>
+          </a:xfrm>
+          <a:prstGeom prst="rect">
+            <a:avLst/>
+          </a:prstGeom>
+        </p:spPr>
+      </p:pic>
+      <p:sp>
+        <p:nvSpPr>
+          <p:cNvPr id="20" name="Textfeld 19">
+            <a:extLst>
+              <a:ext uri="{FF2B5EF4-FFF2-40B4-BE49-F238E27FC236}">
+                <a16:creationId xmlns:a16="http://schemas.microsoft.com/office/drawing/2014/main" id="{DDBFCDBB-2570-2263-BDC7-8490294C08CB}"/>
+              </a:ext>
+            </a:extLst>
+          </p:cNvPr>
+          <p:cNvSpPr txBox="1"/>
+          <p:nvPr/>
+        </p:nvSpPr>
+        <p:spPr>
+          <a:xfrm>
+            <a:off x="1427613" y="737048"/>
+            <a:ext cx="1570273" cy="482696"/>
+          </a:xfrm>
+          <a:prstGeom prst="rect">
+            <a:avLst/>
+          </a:prstGeom>
+          <a:noFill/>
+        </p:spPr>
+        <p:txBody>
+          <a:bodyPr wrap="square">
+            <a:spAutoFit/>
+          </a:bodyPr>
+          <a:lstStyle/>
+          <a:p>
+            <a:pPr algn="ctr" latinLnBrk="1">
+              <a:lnSpc>
+                <a:spcPts val="1470"/>
+              </a:lnSpc>
+              <a:buNone/>
+            </a:pPr>
+            <a:r>
+              <a:rPr lang="de-DE" sz="1400" b="1" dirty="0" err="1">
+                <a:latin typeface="Cascadia Code" panose="020B0609020000020004" pitchFamily="49" charset="0"/>
+                <a:ea typeface="ADLaM Display" panose="020F0502020204030204" pitchFamily="2" charset="0"/>
+                <a:cs typeface="Cascadia Code" panose="020B0609020000020004" pitchFamily="49" charset="0"/>
+              </a:rPr>
+              <a:t>data</a:t>
+            </a:r>
+            <a:br>
+              <a:rPr lang="de-DE" sz="1400" b="1" dirty="0">
+                <a:latin typeface="Cascadia Code" panose="020B0609020000020004" pitchFamily="49" charset="0"/>
+                <a:ea typeface="ADLaM Display" panose="020F0502020204030204" pitchFamily="2" charset="0"/>
+                <a:cs typeface="Cascadia Code" panose="020B0609020000020004" pitchFamily="49" charset="0"/>
+              </a:rPr>
+            </a:br>
+            <a:r>
+              <a:rPr lang="de-DE" sz="1400" b="1" dirty="0" err="1">
+                <a:latin typeface="Cascadia Code" panose="020B0609020000020004" pitchFamily="49" charset="0"/>
+                <a:ea typeface="ADLaM Display" panose="020F0502020204030204" pitchFamily="2" charset="0"/>
+                <a:cs typeface="Cascadia Code" panose="020B0609020000020004" pitchFamily="49" charset="0"/>
+              </a:rPr>
+              <a:t>backup</a:t>
+            </a:r>
+            <a:endParaRPr lang="de-DE" sz="1400" b="1" i="0" dirty="0">
+              <a:effectLst/>
+              <a:latin typeface="Courier New" panose="02070309020205020404" pitchFamily="49" charset="0"/>
+              <a:cs typeface="Courier New" panose="02070309020205020404" pitchFamily="49" charset="0"/>
+            </a:endParaRPr>
+          </a:p>
+        </p:txBody>
+      </p:sp>
+    </p:spTree>
+    <p:extLst>
+      <p:ext uri="{BB962C8B-B14F-4D97-AF65-F5344CB8AC3E}">
+        <p14:creationId xmlns:p14="http://schemas.microsoft.com/office/powerpoint/2010/main" val="1574219023"/>
       </p:ext>
     </p:extLst>
   </p:cSld>

</xml_diff>